<commit_message>
escopo do exemplo adicionado ao exemplo, e alteracao na descricao do corpo dos arquivos readme correspondete a sua pasta
</commit_message>
<xml_diff>
--- a/apresentacao/Apresentação - Teste de Software.pptx
+++ b/apresentacao/Apresentação - Teste de Software.pptx
@@ -20060,10 +20060,10 @@
         </p:nvGrpSpPr>
         <p:grpSpPr>
           <a:xfrm>
-            <a:off x="6902886" y="2539572"/>
-            <a:ext cx="3830228" cy="899137"/>
-            <a:chOff x="1905778" y="3084327"/>
-            <a:chExt cx="3860360" cy="858047"/>
+            <a:off x="7096524" y="2676733"/>
+            <a:ext cx="2577420" cy="646331"/>
+            <a:chOff x="1905778" y="3377408"/>
+            <a:chExt cx="2597697" cy="616794"/>
           </a:xfrm>
         </p:grpSpPr>
         <p:pic>
@@ -20088,8 +20088,8 @@
           </p:blipFill>
           <p:spPr>
             <a:xfrm>
-              <a:off x="1905778" y="3084327"/>
-              <a:ext cx="858048" cy="858047"/>
+              <a:off x="1905778" y="3429237"/>
+              <a:ext cx="513138" cy="513137"/>
             </a:xfrm>
             <a:prstGeom prst="rect">
               <a:avLst/>
@@ -20104,8 +20104,8 @@
           </p:nvSpPr>
           <p:spPr>
             <a:xfrm>
-              <a:off x="2958188" y="3122079"/>
-              <a:ext cx="2807950" cy="788049"/>
+              <a:off x="2418916" y="3377408"/>
+              <a:ext cx="2084559" cy="616794"/>
             </a:xfrm>
             <a:prstGeom prst="rect">
               <a:avLst/>
@@ -20119,14 +20119,14 @@
             <a:lstStyle/>
             <a:p>
               <a:r>
-                <a:rPr lang="pt-BR" sz="2400" b="1" dirty="0" smtClean="0">
+                <a:rPr lang="pt-BR" b="1" dirty="0" smtClean="0">
                   <a:solidFill>
                     <a:schemeClr val="bg1"/>
                   </a:solidFill>
                 </a:rPr>
                 <a:t>WORKSHOP PARA DESENVOLVEDORES</a:t>
               </a:r>
-              <a:endParaRPr lang="pt-BR" sz="2400" dirty="0">
+              <a:endParaRPr lang="pt-BR" dirty="0">
                 <a:solidFill>
                   <a:schemeClr val="bg1"/>
                 </a:solidFill>
@@ -20398,36 +20398,89 @@
           </a:p>
         </p:txBody>
       </p:sp>
-      <p:pic>
-        <p:nvPicPr>
-          <p:cNvPr id="13" name="Imagem 12"/>
-          <p:cNvPicPr>
-            <a:picLocks noChangeAspect="1"/>
-          </p:cNvPicPr>
+      <p:grpSp>
+        <p:nvGrpSpPr>
+          <p:cNvPr id="16" name="Grupo 15"/>
+          <p:cNvGrpSpPr/>
           <p:nvPr/>
-        </p:nvPicPr>
-        <p:blipFill>
-          <a:blip r:embed="rId5">
-            <a:extLst>
-              <a:ext uri="{28A0092B-C50C-407E-A947-70E740481C1C}">
-                <a14:useLocalDpi xmlns:a14="http://schemas.microsoft.com/office/drawing/2010/main" val="0"/>
-              </a:ext>
-            </a:extLst>
-          </a:blip>
-          <a:stretch>
-            <a:fillRect/>
-          </a:stretch>
-        </p:blipFill>
-        <p:spPr>
+        </p:nvGrpSpPr>
+        <p:grpSpPr>
           <a:xfrm>
-            <a:off x="2036263" y="4407482"/>
-            <a:ext cx="1068863" cy="1068863"/>
+            <a:off x="3750942" y="4328515"/>
+            <a:ext cx="5185952" cy="986636"/>
+            <a:chOff x="2036264" y="4489709"/>
+            <a:chExt cx="5185952" cy="986636"/>
           </a:xfrm>
-          <a:prstGeom prst="rect">
-            <a:avLst/>
-          </a:prstGeom>
-        </p:spPr>
-      </p:pic>
+        </p:grpSpPr>
+        <p:pic>
+          <p:nvPicPr>
+            <p:cNvPr id="13" name="Imagem 12"/>
+            <p:cNvPicPr>
+              <a:picLocks noChangeAspect="1"/>
+            </p:cNvPicPr>
+            <p:nvPr/>
+          </p:nvPicPr>
+          <p:blipFill>
+            <a:blip r:embed="rId5" cstate="print">
+              <a:extLst>
+                <a:ext uri="{28A0092B-C50C-407E-A947-70E740481C1C}">
+                  <a14:useLocalDpi xmlns:a14="http://schemas.microsoft.com/office/drawing/2010/main" val="0"/>
+                </a:ext>
+              </a:extLst>
+            </a:blip>
+            <a:stretch>
+              <a:fillRect/>
+            </a:stretch>
+          </p:blipFill>
+          <p:spPr>
+            <a:xfrm>
+              <a:off x="2036264" y="4489709"/>
+              <a:ext cx="986636" cy="986636"/>
+            </a:xfrm>
+            <a:prstGeom prst="rect">
+              <a:avLst/>
+            </a:prstGeom>
+          </p:spPr>
+        </p:pic>
+        <p:sp>
+          <p:nvSpPr>
+            <p:cNvPr id="15" name="CaixaDeTexto 14"/>
+            <p:cNvSpPr txBox="1"/>
+            <p:nvPr/>
+          </p:nvSpPr>
+          <p:spPr>
+            <a:xfrm>
+              <a:off x="3022900" y="4754611"/>
+              <a:ext cx="4199316" cy="461665"/>
+            </a:xfrm>
+            <a:prstGeom prst="rect">
+              <a:avLst/>
+            </a:prstGeom>
+            <a:noFill/>
+          </p:spPr>
+          <p:txBody>
+            <a:bodyPr wrap="square" rtlCol="0">
+              <a:spAutoFit/>
+            </a:bodyPr>
+            <a:lstStyle/>
+            <a:p>
+              <a:r>
+                <a:rPr lang="pt-BR" sz="2400" b="1" dirty="0">
+                  <a:solidFill>
+                    <a:schemeClr val="bg1"/>
+                  </a:solidFill>
+                </a:rPr>
+                <a:t>https://github.com/DevIFES</a:t>
+              </a:r>
+              <a:endParaRPr lang="pt-BR" sz="2400" dirty="0">
+                <a:solidFill>
+                  <a:schemeClr val="bg1"/>
+                </a:solidFill>
+              </a:endParaRPr>
+            </a:p>
+          </p:txBody>
+        </p:sp>
+      </p:grpSp>
     </p:spTree>
     <p:extLst>
       <p:ext uri="{BB962C8B-B14F-4D97-AF65-F5344CB8AC3E}">

</xml_diff>

<commit_message>
somente adicionado uma pequena atualização na apresentação
</commit_message>
<xml_diff>
--- a/apresentacao/Apresentação - Teste de Software.pptx
+++ b/apresentacao/Apresentação - Teste de Software.pptx
@@ -5,7 +5,7 @@
     <p:sldMasterId id="2147483648" r:id="rId1"/>
   </p:sldMasterIdLst>
   <p:notesMasterIdLst>
-    <p:notesMasterId r:id="rId57"/>
+    <p:notesMasterId r:id="rId59"/>
   </p:notesMasterIdLst>
   <p:sldIdLst>
     <p:sldId id="257" r:id="rId2"/>
@@ -53,16 +53,18 @@
     <p:sldId id="280" r:id="rId44"/>
     <p:sldId id="284" r:id="rId45"/>
     <p:sldId id="329" r:id="rId46"/>
-    <p:sldId id="283" r:id="rId47"/>
-    <p:sldId id="301" r:id="rId48"/>
-    <p:sldId id="336" r:id="rId49"/>
-    <p:sldId id="335" r:id="rId50"/>
-    <p:sldId id="334" r:id="rId51"/>
-    <p:sldId id="342" r:id="rId52"/>
-    <p:sldId id="337" r:id="rId53"/>
-    <p:sldId id="299" r:id="rId54"/>
-    <p:sldId id="263" r:id="rId55"/>
-    <p:sldId id="289" r:id="rId56"/>
+    <p:sldId id="301" r:id="rId47"/>
+    <p:sldId id="336" r:id="rId48"/>
+    <p:sldId id="335" r:id="rId49"/>
+    <p:sldId id="334" r:id="rId50"/>
+    <p:sldId id="342" r:id="rId51"/>
+    <p:sldId id="337" r:id="rId52"/>
+    <p:sldId id="283" r:id="rId53"/>
+    <p:sldId id="351" r:id="rId54"/>
+    <p:sldId id="352" r:id="rId55"/>
+    <p:sldId id="299" r:id="rId56"/>
+    <p:sldId id="263" r:id="rId57"/>
+    <p:sldId id="289" r:id="rId58"/>
   </p:sldIdLst>
   <p:sldSz cx="12192000" cy="6858000"/>
   <p:notesSz cx="6858000" cy="9144000"/>
@@ -3953,7 +3955,7 @@
     </p:spTree>
     <p:extLst>
       <p:ext uri="{BB962C8B-B14F-4D97-AF65-F5344CB8AC3E}">
-        <p14:creationId xmlns:p14="http://schemas.microsoft.com/office/powerpoint/2010/main" val="3526596954"/>
+        <p14:creationId xmlns:p14="http://schemas.microsoft.com/office/powerpoint/2010/main" val="2155033306"/>
       </p:ext>
     </p:extLst>
   </p:cSld>
@@ -4037,7 +4039,7 @@
     </p:spTree>
     <p:extLst>
       <p:ext uri="{BB962C8B-B14F-4D97-AF65-F5344CB8AC3E}">
-        <p14:creationId xmlns:p14="http://schemas.microsoft.com/office/powerpoint/2010/main" val="2155033306"/>
+        <p14:creationId xmlns:p14="http://schemas.microsoft.com/office/powerpoint/2010/main" val="852162663"/>
       </p:ext>
     </p:extLst>
   </p:cSld>
@@ -4121,7 +4123,7 @@
     </p:spTree>
     <p:extLst>
       <p:ext uri="{BB962C8B-B14F-4D97-AF65-F5344CB8AC3E}">
-        <p14:creationId xmlns:p14="http://schemas.microsoft.com/office/powerpoint/2010/main" val="852162663"/>
+        <p14:creationId xmlns:p14="http://schemas.microsoft.com/office/powerpoint/2010/main" val="858867956"/>
       </p:ext>
     </p:extLst>
   </p:cSld>
@@ -4205,7 +4207,7 @@
     </p:spTree>
     <p:extLst>
       <p:ext uri="{BB962C8B-B14F-4D97-AF65-F5344CB8AC3E}">
-        <p14:creationId xmlns:p14="http://schemas.microsoft.com/office/powerpoint/2010/main" val="858867956"/>
+        <p14:creationId xmlns:p14="http://schemas.microsoft.com/office/powerpoint/2010/main" val="1498058813"/>
       </p:ext>
     </p:extLst>
   </p:cSld>
@@ -4373,7 +4375,7 @@
     </p:spTree>
     <p:extLst>
       <p:ext uri="{BB962C8B-B14F-4D97-AF65-F5344CB8AC3E}">
-        <p14:creationId xmlns:p14="http://schemas.microsoft.com/office/powerpoint/2010/main" val="1498058813"/>
+        <p14:creationId xmlns:p14="http://schemas.microsoft.com/office/powerpoint/2010/main" val="1398181610"/>
       </p:ext>
     </p:extLst>
   </p:cSld>
@@ -4457,7 +4459,7 @@
     </p:spTree>
     <p:extLst>
       <p:ext uri="{BB962C8B-B14F-4D97-AF65-F5344CB8AC3E}">
-        <p14:creationId xmlns:p14="http://schemas.microsoft.com/office/powerpoint/2010/main" val="1398181610"/>
+        <p14:creationId xmlns:p14="http://schemas.microsoft.com/office/powerpoint/2010/main" val="2999621890"/>
       </p:ext>
     </p:extLst>
   </p:cSld>
@@ -4541,7 +4543,7 @@
     </p:spTree>
     <p:extLst>
       <p:ext uri="{BB962C8B-B14F-4D97-AF65-F5344CB8AC3E}">
-        <p14:creationId xmlns:p14="http://schemas.microsoft.com/office/powerpoint/2010/main" val="2999621890"/>
+        <p14:creationId xmlns:p14="http://schemas.microsoft.com/office/powerpoint/2010/main" val="3526596954"/>
       </p:ext>
     </p:extLst>
   </p:cSld>
@@ -4625,7 +4627,7 @@
     </p:spTree>
     <p:extLst>
       <p:ext uri="{BB962C8B-B14F-4D97-AF65-F5344CB8AC3E}">
-        <p14:creationId xmlns:p14="http://schemas.microsoft.com/office/powerpoint/2010/main" val="965338943"/>
+        <p14:creationId xmlns:p14="http://schemas.microsoft.com/office/powerpoint/2010/main" val="2359403158"/>
       </p:ext>
     </p:extLst>
   </p:cSld>
@@ -4709,7 +4711,7 @@
     </p:spTree>
     <p:extLst>
       <p:ext uri="{BB962C8B-B14F-4D97-AF65-F5344CB8AC3E}">
-        <p14:creationId xmlns:p14="http://schemas.microsoft.com/office/powerpoint/2010/main" val="1195581815"/>
+        <p14:creationId xmlns:p14="http://schemas.microsoft.com/office/powerpoint/2010/main" val="2941280304"/>
       </p:ext>
     </p:extLst>
   </p:cSld>
@@ -4785,6 +4787,174 @@
             <a:fld id="{E893CCE3-5ABE-4F1A-B851-C3AD362A2F3A}" type="slidenum">
               <a:rPr lang="pt-BR" smtClean="0"/>
               <a:t>55</a:t>
+            </a:fld>
+            <a:endParaRPr lang="pt-BR"/>
+          </a:p>
+        </p:txBody>
+      </p:sp>
+    </p:spTree>
+    <p:extLst>
+      <p:ext uri="{BB962C8B-B14F-4D97-AF65-F5344CB8AC3E}">
+        <p14:creationId xmlns:p14="http://schemas.microsoft.com/office/powerpoint/2010/main" val="965338943"/>
+      </p:ext>
+    </p:extLst>
+  </p:cSld>
+  <p:clrMapOvr>
+    <a:masterClrMapping/>
+  </p:clrMapOvr>
+</p:notes>
+</file>
+
+<file path=ppt/notesSlides/notesSlide56.xml><?xml version="1.0" encoding="utf-8"?>
+<p:notes xmlns:a="http://schemas.openxmlformats.org/drawingml/2006/main" xmlns:r="http://schemas.openxmlformats.org/officeDocument/2006/relationships" xmlns:p="http://schemas.openxmlformats.org/presentationml/2006/main">
+  <p:cSld>
+    <p:spTree>
+      <p:nvGrpSpPr>
+        <p:cNvPr id="1" name=""/>
+        <p:cNvGrpSpPr/>
+        <p:nvPr/>
+      </p:nvGrpSpPr>
+      <p:grpSpPr>
+        <a:xfrm>
+          <a:off x="0" y="0"/>
+          <a:ext cx="0" cy="0"/>
+          <a:chOff x="0" y="0"/>
+          <a:chExt cx="0" cy="0"/>
+        </a:xfrm>
+      </p:grpSpPr>
+      <p:sp>
+        <p:nvSpPr>
+          <p:cNvPr id="2" name="Espaço Reservado para Imagem de Slide 1"/>
+          <p:cNvSpPr>
+            <a:spLocks noGrp="1" noRot="1" noChangeAspect="1"/>
+          </p:cNvSpPr>
+          <p:nvPr>
+            <p:ph type="sldImg"/>
+          </p:nvPr>
+        </p:nvSpPr>
+        <p:spPr/>
+      </p:sp>
+      <p:sp>
+        <p:nvSpPr>
+          <p:cNvPr id="3" name="Espaço Reservado para Anotações 2"/>
+          <p:cNvSpPr>
+            <a:spLocks noGrp="1"/>
+          </p:cNvSpPr>
+          <p:nvPr>
+            <p:ph type="body" idx="1"/>
+          </p:nvPr>
+        </p:nvSpPr>
+        <p:spPr/>
+        <p:txBody>
+          <a:bodyPr/>
+          <a:lstStyle/>
+          <a:p>
+            <a:endParaRPr lang="pt-BR"/>
+          </a:p>
+        </p:txBody>
+      </p:sp>
+      <p:sp>
+        <p:nvSpPr>
+          <p:cNvPr id="4" name="Espaço Reservado para Número de Slide 3"/>
+          <p:cNvSpPr>
+            <a:spLocks noGrp="1"/>
+          </p:cNvSpPr>
+          <p:nvPr>
+            <p:ph type="sldNum" sz="quarter" idx="10"/>
+          </p:nvPr>
+        </p:nvSpPr>
+        <p:spPr/>
+        <p:txBody>
+          <a:bodyPr/>
+          <a:lstStyle/>
+          <a:p>
+            <a:fld id="{E893CCE3-5ABE-4F1A-B851-C3AD362A2F3A}" type="slidenum">
+              <a:rPr lang="pt-BR" smtClean="0"/>
+              <a:t>56</a:t>
+            </a:fld>
+            <a:endParaRPr lang="pt-BR"/>
+          </a:p>
+        </p:txBody>
+      </p:sp>
+    </p:spTree>
+    <p:extLst>
+      <p:ext uri="{BB962C8B-B14F-4D97-AF65-F5344CB8AC3E}">
+        <p14:creationId xmlns:p14="http://schemas.microsoft.com/office/powerpoint/2010/main" val="1195581815"/>
+      </p:ext>
+    </p:extLst>
+  </p:cSld>
+  <p:clrMapOvr>
+    <a:masterClrMapping/>
+  </p:clrMapOvr>
+</p:notes>
+</file>
+
+<file path=ppt/notesSlides/notesSlide57.xml><?xml version="1.0" encoding="utf-8"?>
+<p:notes xmlns:a="http://schemas.openxmlformats.org/drawingml/2006/main" xmlns:r="http://schemas.openxmlformats.org/officeDocument/2006/relationships" xmlns:p="http://schemas.openxmlformats.org/presentationml/2006/main">
+  <p:cSld>
+    <p:spTree>
+      <p:nvGrpSpPr>
+        <p:cNvPr id="1" name=""/>
+        <p:cNvGrpSpPr/>
+        <p:nvPr/>
+      </p:nvGrpSpPr>
+      <p:grpSpPr>
+        <a:xfrm>
+          <a:off x="0" y="0"/>
+          <a:ext cx="0" cy="0"/>
+          <a:chOff x="0" y="0"/>
+          <a:chExt cx="0" cy="0"/>
+        </a:xfrm>
+      </p:grpSpPr>
+      <p:sp>
+        <p:nvSpPr>
+          <p:cNvPr id="2" name="Espaço Reservado para Imagem de Slide 1"/>
+          <p:cNvSpPr>
+            <a:spLocks noGrp="1" noRot="1" noChangeAspect="1"/>
+          </p:cNvSpPr>
+          <p:nvPr>
+            <p:ph type="sldImg"/>
+          </p:nvPr>
+        </p:nvSpPr>
+        <p:spPr/>
+      </p:sp>
+      <p:sp>
+        <p:nvSpPr>
+          <p:cNvPr id="3" name="Espaço Reservado para Anotações 2"/>
+          <p:cNvSpPr>
+            <a:spLocks noGrp="1"/>
+          </p:cNvSpPr>
+          <p:nvPr>
+            <p:ph type="body" idx="1"/>
+          </p:nvPr>
+        </p:nvSpPr>
+        <p:spPr/>
+        <p:txBody>
+          <a:bodyPr/>
+          <a:lstStyle/>
+          <a:p>
+            <a:endParaRPr lang="pt-BR"/>
+          </a:p>
+        </p:txBody>
+      </p:sp>
+      <p:sp>
+        <p:nvSpPr>
+          <p:cNvPr id="4" name="Espaço Reservado para Número de Slide 3"/>
+          <p:cNvSpPr>
+            <a:spLocks noGrp="1"/>
+          </p:cNvSpPr>
+          <p:nvPr>
+            <p:ph type="sldNum" sz="quarter" idx="10"/>
+          </p:nvPr>
+        </p:nvSpPr>
+        <p:spPr/>
+        <p:txBody>
+          <a:bodyPr/>
+          <a:lstStyle/>
+          <a:p>
+            <a:fld id="{E893CCE3-5ABE-4F1A-B851-C3AD362A2F3A}" type="slidenum">
+              <a:rPr lang="pt-BR" smtClean="0"/>
+              <a:t>57</a:t>
             </a:fld>
             <a:endParaRPr lang="pt-BR"/>
           </a:p>
@@ -8476,13 +8646,13 @@
   <p:clrMapOvr>
     <a:masterClrMapping/>
   </p:clrMapOvr>
-  <mc:AlternateContent xmlns:mc="http://schemas.openxmlformats.org/markup-compatibility/2006">
-    <mc:Choice xmlns:p14="http://schemas.microsoft.com/office/powerpoint/2010/main" Requires="p14">
+  <mc:AlternateContent xmlns:mc="http://schemas.openxmlformats.org/markup-compatibility/2006" xmlns:p14="http://schemas.microsoft.com/office/powerpoint/2010/main">
+    <mc:Choice Requires="p14">
       <p:transition spd="med" p14:dur="700">
         <p:fade/>
       </p:transition>
     </mc:Choice>
-    <mc:Fallback>
+    <mc:Fallback xmlns="">
       <p:transition spd="med">
         <p:fade/>
       </p:transition>
@@ -9363,13 +9533,13 @@
   <p:clrMapOvr>
     <a:masterClrMapping/>
   </p:clrMapOvr>
-  <mc:AlternateContent xmlns:mc="http://schemas.openxmlformats.org/markup-compatibility/2006">
-    <mc:Choice xmlns:p14="http://schemas.microsoft.com/office/powerpoint/2010/main" Requires="p14">
+  <mc:AlternateContent xmlns:mc="http://schemas.openxmlformats.org/markup-compatibility/2006" xmlns:p14="http://schemas.microsoft.com/office/powerpoint/2010/main">
+    <mc:Choice Requires="p14">
       <p:transition spd="med" p14:dur="700">
         <p:fade/>
       </p:transition>
     </mc:Choice>
-    <mc:Fallback>
+    <mc:Fallback xmlns="">
       <p:transition spd="med">
         <p:fade/>
       </p:transition>
@@ -10061,13 +10231,13 @@
   <p:clrMapOvr>
     <a:masterClrMapping/>
   </p:clrMapOvr>
-  <mc:AlternateContent xmlns:mc="http://schemas.openxmlformats.org/markup-compatibility/2006">
-    <mc:Choice xmlns:p14="http://schemas.microsoft.com/office/powerpoint/2010/main" Requires="p14">
+  <mc:AlternateContent xmlns:mc="http://schemas.openxmlformats.org/markup-compatibility/2006" xmlns:p14="http://schemas.microsoft.com/office/powerpoint/2010/main">
+    <mc:Choice Requires="p14">
       <p:transition spd="med" p14:dur="700">
         <p:fade/>
       </p:transition>
     </mc:Choice>
-    <mc:Fallback>
+    <mc:Fallback xmlns="">
       <p:transition spd="med">
         <p:fade/>
       </p:transition>
@@ -10437,13 +10607,13 @@
   <p:clrMapOvr>
     <a:masterClrMapping/>
   </p:clrMapOvr>
-  <mc:AlternateContent xmlns:mc="http://schemas.openxmlformats.org/markup-compatibility/2006">
-    <mc:Choice xmlns:p14="http://schemas.microsoft.com/office/powerpoint/2010/main" Requires="p14">
+  <mc:AlternateContent xmlns:mc="http://schemas.openxmlformats.org/markup-compatibility/2006" xmlns:p14="http://schemas.microsoft.com/office/powerpoint/2010/main">
+    <mc:Choice Requires="p14">
       <p:transition spd="med" p14:dur="700">
         <p:fade/>
       </p:transition>
     </mc:Choice>
-    <mc:Fallback>
+    <mc:Fallback xmlns="">
       <p:transition spd="med">
         <p:fade/>
       </p:transition>
@@ -10879,11 +11049,6 @@
               </a:rPr>
               <a:t>FALHA: Processamento incorreto e comportamento inconsistente</a:t>
             </a:r>
-            <a:endParaRPr lang="pt-BR" sz="2200" b="1" dirty="0">
-              <a:solidFill>
-                <a:schemeClr val="bg1"/>
-              </a:solidFill>
-            </a:endParaRPr>
           </a:p>
         </p:txBody>
       </p:sp>
@@ -10897,13 +11062,13 @@
   <p:clrMapOvr>
     <a:masterClrMapping/>
   </p:clrMapOvr>
-  <mc:AlternateContent xmlns:mc="http://schemas.openxmlformats.org/markup-compatibility/2006">
-    <mc:Choice xmlns:p14="http://schemas.microsoft.com/office/powerpoint/2010/main" Requires="p14">
+  <mc:AlternateContent xmlns:mc="http://schemas.openxmlformats.org/markup-compatibility/2006" xmlns:p14="http://schemas.microsoft.com/office/powerpoint/2010/main">
+    <mc:Choice Requires="p14">
       <p:transition spd="med" p14:dur="700">
         <p:fade/>
       </p:transition>
     </mc:Choice>
-    <mc:Fallback>
+    <mc:Fallback xmlns="">
       <p:transition spd="med">
         <p:fade/>
       </p:transition>
@@ -11219,13 +11384,13 @@
   <p:clrMapOvr>
     <a:masterClrMapping/>
   </p:clrMapOvr>
-  <mc:AlternateContent xmlns:mc="http://schemas.openxmlformats.org/markup-compatibility/2006">
-    <mc:Choice xmlns:p14="http://schemas.microsoft.com/office/powerpoint/2010/main" Requires="p14">
+  <mc:AlternateContent xmlns:mc="http://schemas.openxmlformats.org/markup-compatibility/2006" xmlns:p14="http://schemas.microsoft.com/office/powerpoint/2010/main">
+    <mc:Choice Requires="p14">
       <p:transition spd="med" p14:dur="700">
         <p:fade/>
       </p:transition>
     </mc:Choice>
-    <mc:Fallback>
+    <mc:Fallback xmlns="">
       <p:transition spd="med">
         <p:fade/>
       </p:transition>
@@ -11481,13 +11646,13 @@
   <p:clrMapOvr>
     <a:masterClrMapping/>
   </p:clrMapOvr>
-  <mc:AlternateContent xmlns:mc="http://schemas.openxmlformats.org/markup-compatibility/2006">
-    <mc:Choice xmlns:p14="http://schemas.microsoft.com/office/powerpoint/2010/main" Requires="p14">
+  <mc:AlternateContent xmlns:mc="http://schemas.openxmlformats.org/markup-compatibility/2006" xmlns:p14="http://schemas.microsoft.com/office/powerpoint/2010/main">
+    <mc:Choice Requires="p14">
       <p:transition spd="med" p14:dur="700">
         <p:fade/>
       </p:transition>
     </mc:Choice>
-    <mc:Fallback>
+    <mc:Fallback xmlns="">
       <p:transition spd="med">
         <p:fade/>
       </p:transition>
@@ -16334,17 +16499,7 @@
                             </a:solidFill>
                           </a:ln>
                         </a:rPr>
-                        <a:t>   </a:t>
-                      </a:r>
-                      <a:r>
-                        <a:rPr lang="pt-BR" sz="2400" dirty="0" smtClean="0">
-                          <a:ln>
-                            <a:solidFill>
-                              <a:schemeClr val="bg1"/>
-                            </a:solidFill>
-                          </a:ln>
-                        </a:rPr>
-                        <a:t>   ESTRUTURAL</a:t>
+                        <a:t>      ESTRUTURAL</a:t>
                       </a:r>
                       <a:endParaRPr lang="pt-BR" sz="2400" dirty="0">
                         <a:ln>
@@ -18515,13 +18670,13 @@
   <p:clrMapOvr>
     <a:masterClrMapping/>
   </p:clrMapOvr>
-  <mc:AlternateContent xmlns:mc="http://schemas.openxmlformats.org/markup-compatibility/2006">
-    <mc:Choice xmlns:p14="http://schemas.microsoft.com/office/powerpoint/2010/main" Requires="p14">
+  <mc:AlternateContent xmlns:mc="http://schemas.openxmlformats.org/markup-compatibility/2006" xmlns:p14="http://schemas.microsoft.com/office/powerpoint/2010/main">
+    <mc:Choice Requires="p14">
       <p:transition spd="med" p14:dur="700">
         <p:fade/>
       </p:transition>
     </mc:Choice>
-    <mc:Fallback>
+    <mc:Fallback xmlns="">
       <p:transition spd="med">
         <p:fade/>
       </p:transition>
@@ -18906,11 +19061,6 @@
                   </a:rPr>
                   <a:t>ANÁLISE PROJETO</a:t>
                 </a:r>
-                <a:endParaRPr lang="pt-BR" sz="2200" b="1" dirty="0">
-                  <a:solidFill>
-                    <a:schemeClr val="bg1"/>
-                  </a:solidFill>
-                </a:endParaRPr>
               </a:p>
             </p:txBody>
           </p:sp>
@@ -18944,11 +19094,6 @@
                   </a:rPr>
                   <a:t>DESENVOLVIMENTO</a:t>
                 </a:r>
-                <a:endParaRPr lang="pt-BR" sz="2200" b="1" dirty="0">
-                  <a:solidFill>
-                    <a:schemeClr val="bg1"/>
-                  </a:solidFill>
-                </a:endParaRPr>
               </a:p>
             </p:txBody>
           </p:sp>
@@ -19020,11 +19165,6 @@
                   </a:rPr>
                   <a:t>TESTE DE ACEITAÇÃO</a:t>
                 </a:r>
-                <a:endParaRPr lang="pt-BR" sz="2200" b="1" dirty="0">
-                  <a:solidFill>
-                    <a:schemeClr val="bg1"/>
-                  </a:solidFill>
-                </a:endParaRPr>
               </a:p>
             </p:txBody>
           </p:sp>
@@ -19058,11 +19198,6 @@
                   </a:rPr>
                   <a:t>TESTE DE SISTEMA</a:t>
                 </a:r>
-                <a:endParaRPr lang="pt-BR" sz="2200" b="1" dirty="0">
-                  <a:solidFill>
-                    <a:schemeClr val="bg1"/>
-                  </a:solidFill>
-                </a:endParaRPr>
               </a:p>
             </p:txBody>
           </p:sp>
@@ -19096,11 +19231,6 @@
                   </a:rPr>
                   <a:t>TESTE DE INTEGRAÇÃO</a:t>
                 </a:r>
-                <a:endParaRPr lang="pt-BR" sz="2200" b="1" dirty="0">
-                  <a:solidFill>
-                    <a:schemeClr val="bg1"/>
-                  </a:solidFill>
-                </a:endParaRPr>
               </a:p>
             </p:txBody>
           </p:sp>
@@ -19134,11 +19264,6 @@
                   </a:rPr>
                   <a:t>TESTE DE UNIDADE</a:t>
                 </a:r>
-                <a:endParaRPr lang="pt-BR" sz="2200" b="1" dirty="0">
-                  <a:solidFill>
-                    <a:schemeClr val="bg1"/>
-                  </a:solidFill>
-                </a:endParaRPr>
               </a:p>
             </p:txBody>
           </p:sp>
@@ -20437,53 +20562,20 @@
           <a:chExt cx="0" cy="0"/>
         </a:xfrm>
       </p:grpSpPr>
-      <p:pic>
-        <p:nvPicPr>
-          <p:cNvPr id="5" name="Imagem 4"/>
-          <p:cNvPicPr>
-            <a:picLocks noChangeAspect="1"/>
-          </p:cNvPicPr>
-          <p:nvPr/>
-        </p:nvPicPr>
-        <p:blipFill>
-          <a:blip r:embed="rId3">
-            <a:extLst>
-              <a:ext uri="{28A0092B-C50C-407E-A947-70E740481C1C}">
-                <a14:useLocalDpi xmlns:a14="http://schemas.microsoft.com/office/drawing/2010/main" val="0"/>
-              </a:ext>
-            </a:extLst>
-          </a:blip>
-          <a:stretch>
-            <a:fillRect/>
-          </a:stretch>
-        </p:blipFill>
+      <p:sp>
+        <p:nvSpPr>
+          <p:cNvPr id="4" name="Título 1"/>
+          <p:cNvSpPr>
+            <a:spLocks noGrp="1"/>
+          </p:cNvSpPr>
+          <p:nvPr>
+            <p:ph type="title"/>
+          </p:nvPr>
+        </p:nvSpPr>
         <p:spPr>
           <a:xfrm>
-            <a:off x="10338233" y="4949204"/>
-            <a:ext cx="1513115" cy="1573040"/>
-          </a:xfrm>
-          <a:prstGeom prst="rect">
-            <a:avLst/>
-          </a:prstGeom>
-          <a:solidFill>
-            <a:schemeClr val="accent2"/>
-          </a:solidFill>
-        </p:spPr>
-      </p:pic>
-      <p:sp>
-        <p:nvSpPr>
-          <p:cNvPr id="7" name="Título 1"/>
-          <p:cNvSpPr>
-            <a:spLocks noGrp="1"/>
-          </p:cNvSpPr>
-          <p:nvPr>
-            <p:ph type="title"/>
-          </p:nvPr>
-        </p:nvSpPr>
-        <p:spPr>
-          <a:xfrm>
-            <a:off x="838200" y="365125"/>
-            <a:ext cx="10515600" cy="1325563"/>
+            <a:off x="355991" y="2666228"/>
+            <a:ext cx="11341100" cy="1325563"/>
           </a:xfrm>
         </p:spPr>
         <p:txBody>
@@ -20500,7 +20592,7 @@
                 </a:solidFill>
                 <a:latin typeface="KiloGram" pitchFamily="50" charset="0"/>
               </a:rPr>
-              <a:t>CASO DE TESTE</a:t>
+              <a:t>EXEMPLO</a:t>
             </a:r>
             <a:endParaRPr lang="pt-BR" sz="4800" dirty="0">
               <a:solidFill>
@@ -20511,67 +20603,10 @@
           </a:p>
         </p:txBody>
       </p:sp>
-      <p:sp>
-        <p:nvSpPr>
-          <p:cNvPr id="8" name="Espaço Reservado para Conteúdo 2"/>
-          <p:cNvSpPr>
-            <a:spLocks noGrp="1"/>
-          </p:cNvSpPr>
-          <p:nvPr>
-            <p:ph idx="1"/>
-          </p:nvPr>
-        </p:nvSpPr>
-        <p:spPr>
-          <a:xfrm>
-            <a:off x="838200" y="1825625"/>
-            <a:ext cx="10515600" cy="4351338"/>
-          </a:xfrm>
-        </p:spPr>
-        <p:txBody>
-          <a:bodyPr/>
-          <a:lstStyle/>
-          <a:p>
-            <a:pPr marL="0" indent="0">
-              <a:buNone/>
-            </a:pPr>
-            <a:r>
-              <a:rPr lang="pt-BR" i="1" dirty="0" smtClean="0">
-                <a:solidFill>
-                  <a:schemeClr val="bg1"/>
-                </a:solidFill>
-              </a:rPr>
-              <a:t>“O </a:t>
-            </a:r>
-            <a:r>
-              <a:rPr lang="pt-BR" i="1" dirty="0">
-                <a:solidFill>
-                  <a:schemeClr val="bg1"/>
-                </a:solidFill>
-              </a:rPr>
-              <a:t>caso de teste deve especificar a saída esperada e os resultados esperados do processamento</a:t>
-            </a:r>
-            <a:r>
-              <a:rPr lang="pt-BR" i="1" dirty="0" smtClean="0">
-                <a:solidFill>
-                  <a:schemeClr val="bg1"/>
-                </a:solidFill>
-              </a:rPr>
-              <a:t>.“</a:t>
-            </a:r>
-            <a:endParaRPr lang="pt-BR" i="1" dirty="0">
-              <a:solidFill>
-                <a:schemeClr val="bg1"/>
-              </a:solidFill>
-              <a:latin typeface="Arial" panose="020B0604020202020204" pitchFamily="34" charset="0"/>
-              <a:cs typeface="Arial" panose="020B0604020202020204" pitchFamily="34" charset="0"/>
-            </a:endParaRPr>
-          </a:p>
-        </p:txBody>
-      </p:sp>
     </p:spTree>
     <p:extLst>
       <p:ext uri="{BB962C8B-B14F-4D97-AF65-F5344CB8AC3E}">
-        <p14:creationId xmlns:p14="http://schemas.microsoft.com/office/powerpoint/2010/main" val="4125400256"/>
+        <p14:creationId xmlns:p14="http://schemas.microsoft.com/office/powerpoint/2010/main" val="3190313293"/>
       </p:ext>
     </p:extLst>
   </p:cSld>
@@ -20629,96 +20664,6 @@
         </p:nvSpPr>
         <p:spPr>
           <a:xfrm>
-            <a:off x="355991" y="2666228"/>
-            <a:ext cx="11341100" cy="1325563"/>
-          </a:xfrm>
-        </p:spPr>
-        <p:txBody>
-          <a:bodyPr>
-            <a:normAutofit/>
-          </a:bodyPr>
-          <a:lstStyle/>
-          <a:p>
-            <a:pPr algn="ctr"/>
-            <a:r>
-              <a:rPr lang="pt-BR" sz="4800" dirty="0" smtClean="0">
-                <a:solidFill>
-                  <a:schemeClr val="bg1"/>
-                </a:solidFill>
-                <a:latin typeface="KiloGram" pitchFamily="50" charset="0"/>
-              </a:rPr>
-              <a:t>EXEMPLO</a:t>
-            </a:r>
-            <a:endParaRPr lang="pt-BR" sz="4800" dirty="0">
-              <a:solidFill>
-                <a:schemeClr val="bg1"/>
-              </a:solidFill>
-              <a:latin typeface="KiloGram" pitchFamily="50" charset="0"/>
-            </a:endParaRPr>
-          </a:p>
-        </p:txBody>
-      </p:sp>
-    </p:spTree>
-    <p:extLst>
-      <p:ext uri="{BB962C8B-B14F-4D97-AF65-F5344CB8AC3E}">
-        <p14:creationId xmlns:p14="http://schemas.microsoft.com/office/powerpoint/2010/main" val="3190313293"/>
-      </p:ext>
-    </p:extLst>
-  </p:cSld>
-  <p:clrMapOvr>
-    <a:masterClrMapping/>
-  </p:clrMapOvr>
-  <mc:AlternateContent xmlns:mc="http://schemas.openxmlformats.org/markup-compatibility/2006" xmlns:p14="http://schemas.microsoft.com/office/powerpoint/2010/main">
-    <mc:Choice Requires="p14">
-      <p:transition spd="med" p14:dur="700">
-        <p:fade/>
-      </p:transition>
-    </mc:Choice>
-    <mc:Fallback xmlns="">
-      <p:transition spd="med">
-        <p:fade/>
-      </p:transition>
-    </mc:Fallback>
-  </mc:AlternateContent>
-  <p:timing>
-    <p:tnLst>
-      <p:par>
-        <p:cTn id="1" dur="indefinite" restart="never" nodeType="tmRoot"/>
-      </p:par>
-    </p:tnLst>
-  </p:timing>
-</p:sld>
-</file>
-
-<file path=ppt/slides/slide48.xml><?xml version="1.0" encoding="utf-8"?>
-<p:sld xmlns:a="http://schemas.openxmlformats.org/drawingml/2006/main" xmlns:r="http://schemas.openxmlformats.org/officeDocument/2006/relationships" xmlns:p="http://schemas.openxmlformats.org/presentationml/2006/main">
-  <p:cSld>
-    <p:spTree>
-      <p:nvGrpSpPr>
-        <p:cNvPr id="1" name=""/>
-        <p:cNvGrpSpPr/>
-        <p:nvPr/>
-      </p:nvGrpSpPr>
-      <p:grpSpPr>
-        <a:xfrm>
-          <a:off x="0" y="0"/>
-          <a:ext cx="0" cy="0"/>
-          <a:chOff x="0" y="0"/>
-          <a:chExt cx="0" cy="0"/>
-        </a:xfrm>
-      </p:grpSpPr>
-      <p:sp>
-        <p:nvSpPr>
-          <p:cNvPr id="4" name="Título 1"/>
-          <p:cNvSpPr>
-            <a:spLocks noGrp="1"/>
-          </p:cNvSpPr>
-          <p:nvPr>
-            <p:ph type="title"/>
-          </p:nvPr>
-        </p:nvSpPr>
-        <p:spPr>
-          <a:xfrm>
             <a:off x="381391" y="380228"/>
             <a:ext cx="11341100" cy="1325563"/>
           </a:xfrm>
@@ -20833,7 +20778,7 @@
 </p:sld>
 </file>
 
-<file path=ppt/slides/slide49.xml><?xml version="1.0" encoding="utf-8"?>
+<file path=ppt/slides/slide48.xml><?xml version="1.0" encoding="utf-8"?>
 <p:sld xmlns:a="http://schemas.openxmlformats.org/drawingml/2006/main" xmlns:r="http://schemas.openxmlformats.org/officeDocument/2006/relationships" xmlns:p="http://schemas.openxmlformats.org/presentationml/2006/main">
   <p:cSld>
     <p:spTree>
@@ -21135,176 +21080,7 @@
 </p:sld>
 </file>
 
-<file path=ppt/slides/slide5.xml><?xml version="1.0" encoding="utf-8"?>
-<p:sld xmlns:a="http://schemas.openxmlformats.org/drawingml/2006/main" xmlns:r="http://schemas.openxmlformats.org/officeDocument/2006/relationships" xmlns:p="http://schemas.openxmlformats.org/presentationml/2006/main">
-  <p:cSld>
-    <p:spTree>
-      <p:nvGrpSpPr>
-        <p:cNvPr id="1" name=""/>
-        <p:cNvGrpSpPr/>
-        <p:nvPr/>
-      </p:nvGrpSpPr>
-      <p:grpSpPr>
-        <a:xfrm>
-          <a:off x="0" y="0"/>
-          <a:ext cx="0" cy="0"/>
-          <a:chOff x="0" y="0"/>
-          <a:chExt cx="0" cy="0"/>
-        </a:xfrm>
-      </p:grpSpPr>
-      <p:pic>
-        <p:nvPicPr>
-          <p:cNvPr id="5" name="Imagem 4"/>
-          <p:cNvPicPr>
-            <a:picLocks noChangeAspect="1"/>
-          </p:cNvPicPr>
-          <p:nvPr/>
-        </p:nvPicPr>
-        <p:blipFill>
-          <a:blip r:embed="rId3">
-            <a:extLst>
-              <a:ext uri="{28A0092B-C50C-407E-A947-70E740481C1C}">
-                <a14:useLocalDpi xmlns:a14="http://schemas.microsoft.com/office/drawing/2010/main" val="0"/>
-              </a:ext>
-            </a:extLst>
-          </a:blip>
-          <a:stretch>
-            <a:fillRect/>
-          </a:stretch>
-        </p:blipFill>
-        <p:spPr>
-          <a:xfrm>
-            <a:off x="10338233" y="4949204"/>
-            <a:ext cx="1513115" cy="1573040"/>
-          </a:xfrm>
-          <a:prstGeom prst="rect">
-            <a:avLst/>
-          </a:prstGeom>
-          <a:solidFill>
-            <a:schemeClr val="accent2"/>
-          </a:solidFill>
-        </p:spPr>
-      </p:pic>
-      <p:sp>
-        <p:nvSpPr>
-          <p:cNvPr id="4" name="Título 1"/>
-          <p:cNvSpPr>
-            <a:spLocks noGrp="1"/>
-          </p:cNvSpPr>
-          <p:nvPr>
-            <p:ph type="title"/>
-          </p:nvPr>
-        </p:nvSpPr>
-        <p:spPr>
-          <a:xfrm>
-            <a:off x="838200" y="365125"/>
-            <a:ext cx="10515600" cy="1325563"/>
-          </a:xfrm>
-        </p:spPr>
-        <p:txBody>
-          <a:bodyPr>
-            <a:normAutofit/>
-          </a:bodyPr>
-          <a:lstStyle/>
-          <a:p>
-            <a:pPr algn="ctr"/>
-            <a:r>
-              <a:rPr lang="pt-BR" sz="4800" dirty="0" smtClean="0">
-                <a:solidFill>
-                  <a:schemeClr val="bg1"/>
-                </a:solidFill>
-                <a:latin typeface="KiloGram" pitchFamily="50" charset="0"/>
-              </a:rPr>
-              <a:t>CONTEÚDO </a:t>
-            </a:r>
-            <a:endParaRPr lang="pt-BR" sz="4800" dirty="0">
-              <a:solidFill>
-                <a:schemeClr val="bg1"/>
-              </a:solidFill>
-              <a:latin typeface="KiloGram" pitchFamily="50" charset="0"/>
-            </a:endParaRPr>
-          </a:p>
-        </p:txBody>
-      </p:sp>
-      <p:sp>
-        <p:nvSpPr>
-          <p:cNvPr id="6" name="Espaço Reservado para Conteúdo 2"/>
-          <p:cNvSpPr>
-            <a:spLocks noGrp="1"/>
-          </p:cNvSpPr>
-          <p:nvPr>
-            <p:ph idx="1"/>
-          </p:nvPr>
-        </p:nvSpPr>
-        <p:spPr>
-          <a:xfrm>
-            <a:off x="838200" y="1825625"/>
-            <a:ext cx="10515600" cy="4351338"/>
-          </a:xfrm>
-        </p:spPr>
-        <p:txBody>
-          <a:bodyPr>
-            <a:normAutofit/>
-          </a:bodyPr>
-          <a:lstStyle/>
-          <a:p>
-            <a:r>
-              <a:rPr lang="pt-BR" dirty="0">
-                <a:solidFill>
-                  <a:schemeClr val="bg1"/>
-                </a:solidFill>
-              </a:rPr>
-              <a:t>INTRODUÇÃO AO TESTE DE </a:t>
-            </a:r>
-            <a:r>
-              <a:rPr lang="pt-BR" dirty="0" smtClean="0">
-                <a:solidFill>
-                  <a:schemeClr val="bg1"/>
-                </a:solidFill>
-              </a:rPr>
-              <a:t>SOFTWARE</a:t>
-            </a:r>
-            <a:endParaRPr lang="pt-BR" dirty="0">
-              <a:solidFill>
-                <a:schemeClr val="bg1"/>
-              </a:solidFill>
-            </a:endParaRPr>
-          </a:p>
-        </p:txBody>
-      </p:sp>
-    </p:spTree>
-    <p:extLst>
-      <p:ext uri="{BB962C8B-B14F-4D97-AF65-F5344CB8AC3E}">
-        <p14:creationId xmlns:p14="http://schemas.microsoft.com/office/powerpoint/2010/main" val="1036006405"/>
-      </p:ext>
-    </p:extLst>
-  </p:cSld>
-  <p:clrMapOvr>
-    <a:masterClrMapping/>
-  </p:clrMapOvr>
-  <mc:AlternateContent xmlns:mc="http://schemas.openxmlformats.org/markup-compatibility/2006" xmlns:p14="http://schemas.microsoft.com/office/powerpoint/2010/main">
-    <mc:Choice Requires="p14">
-      <p:transition spd="med" p14:dur="700">
-        <p:fade/>
-      </p:transition>
-    </mc:Choice>
-    <mc:Fallback xmlns="">
-      <p:transition spd="med">
-        <p:fade/>
-      </p:transition>
-    </mc:Fallback>
-  </mc:AlternateContent>
-  <p:timing>
-    <p:tnLst>
-      <p:par>
-        <p:cTn id="1" dur="indefinite" restart="never" nodeType="tmRoot"/>
-      </p:par>
-    </p:tnLst>
-  </p:timing>
-</p:sld>
-</file>
-
-<file path=ppt/slides/slide50.xml><?xml version="1.0" encoding="utf-8"?>
+<file path=ppt/slides/slide49.xml><?xml version="1.0" encoding="utf-8"?>
 <p:sld xmlns:a="http://schemas.openxmlformats.org/drawingml/2006/main" xmlns:r="http://schemas.openxmlformats.org/officeDocument/2006/relationships" xmlns:p="http://schemas.openxmlformats.org/presentationml/2006/main">
   <p:cSld>
     <p:spTree>
@@ -21726,7 +21502,176 @@
 </p:sld>
 </file>
 
-<file path=ppt/slides/slide51.xml><?xml version="1.0" encoding="utf-8"?>
+<file path=ppt/slides/slide5.xml><?xml version="1.0" encoding="utf-8"?>
+<p:sld xmlns:a="http://schemas.openxmlformats.org/drawingml/2006/main" xmlns:r="http://schemas.openxmlformats.org/officeDocument/2006/relationships" xmlns:p="http://schemas.openxmlformats.org/presentationml/2006/main">
+  <p:cSld>
+    <p:spTree>
+      <p:nvGrpSpPr>
+        <p:cNvPr id="1" name=""/>
+        <p:cNvGrpSpPr/>
+        <p:nvPr/>
+      </p:nvGrpSpPr>
+      <p:grpSpPr>
+        <a:xfrm>
+          <a:off x="0" y="0"/>
+          <a:ext cx="0" cy="0"/>
+          <a:chOff x="0" y="0"/>
+          <a:chExt cx="0" cy="0"/>
+        </a:xfrm>
+      </p:grpSpPr>
+      <p:pic>
+        <p:nvPicPr>
+          <p:cNvPr id="5" name="Imagem 4"/>
+          <p:cNvPicPr>
+            <a:picLocks noChangeAspect="1"/>
+          </p:cNvPicPr>
+          <p:nvPr/>
+        </p:nvPicPr>
+        <p:blipFill>
+          <a:blip r:embed="rId3">
+            <a:extLst>
+              <a:ext uri="{28A0092B-C50C-407E-A947-70E740481C1C}">
+                <a14:useLocalDpi xmlns:a14="http://schemas.microsoft.com/office/drawing/2010/main" val="0"/>
+              </a:ext>
+            </a:extLst>
+          </a:blip>
+          <a:stretch>
+            <a:fillRect/>
+          </a:stretch>
+        </p:blipFill>
+        <p:spPr>
+          <a:xfrm>
+            <a:off x="10338233" y="4949204"/>
+            <a:ext cx="1513115" cy="1573040"/>
+          </a:xfrm>
+          <a:prstGeom prst="rect">
+            <a:avLst/>
+          </a:prstGeom>
+          <a:solidFill>
+            <a:schemeClr val="accent2"/>
+          </a:solidFill>
+        </p:spPr>
+      </p:pic>
+      <p:sp>
+        <p:nvSpPr>
+          <p:cNvPr id="4" name="Título 1"/>
+          <p:cNvSpPr>
+            <a:spLocks noGrp="1"/>
+          </p:cNvSpPr>
+          <p:nvPr>
+            <p:ph type="title"/>
+          </p:nvPr>
+        </p:nvSpPr>
+        <p:spPr>
+          <a:xfrm>
+            <a:off x="838200" y="365125"/>
+            <a:ext cx="10515600" cy="1325563"/>
+          </a:xfrm>
+        </p:spPr>
+        <p:txBody>
+          <a:bodyPr>
+            <a:normAutofit/>
+          </a:bodyPr>
+          <a:lstStyle/>
+          <a:p>
+            <a:pPr algn="ctr"/>
+            <a:r>
+              <a:rPr lang="pt-BR" sz="4800" dirty="0" smtClean="0">
+                <a:solidFill>
+                  <a:schemeClr val="bg1"/>
+                </a:solidFill>
+                <a:latin typeface="KiloGram" pitchFamily="50" charset="0"/>
+              </a:rPr>
+              <a:t>CONTEÚDO </a:t>
+            </a:r>
+            <a:endParaRPr lang="pt-BR" sz="4800" dirty="0">
+              <a:solidFill>
+                <a:schemeClr val="bg1"/>
+              </a:solidFill>
+              <a:latin typeface="KiloGram" pitchFamily="50" charset="0"/>
+            </a:endParaRPr>
+          </a:p>
+        </p:txBody>
+      </p:sp>
+      <p:sp>
+        <p:nvSpPr>
+          <p:cNvPr id="6" name="Espaço Reservado para Conteúdo 2"/>
+          <p:cNvSpPr>
+            <a:spLocks noGrp="1"/>
+          </p:cNvSpPr>
+          <p:nvPr>
+            <p:ph idx="1"/>
+          </p:nvPr>
+        </p:nvSpPr>
+        <p:spPr>
+          <a:xfrm>
+            <a:off x="838200" y="1825625"/>
+            <a:ext cx="10515600" cy="4351338"/>
+          </a:xfrm>
+        </p:spPr>
+        <p:txBody>
+          <a:bodyPr>
+            <a:normAutofit/>
+          </a:bodyPr>
+          <a:lstStyle/>
+          <a:p>
+            <a:r>
+              <a:rPr lang="pt-BR" dirty="0">
+                <a:solidFill>
+                  <a:schemeClr val="bg1"/>
+                </a:solidFill>
+              </a:rPr>
+              <a:t>INTRODUÇÃO AO TESTE DE </a:t>
+            </a:r>
+            <a:r>
+              <a:rPr lang="pt-BR" dirty="0" smtClean="0">
+                <a:solidFill>
+                  <a:schemeClr val="bg1"/>
+                </a:solidFill>
+              </a:rPr>
+              <a:t>SOFTWARE</a:t>
+            </a:r>
+            <a:endParaRPr lang="pt-BR" dirty="0">
+              <a:solidFill>
+                <a:schemeClr val="bg1"/>
+              </a:solidFill>
+            </a:endParaRPr>
+          </a:p>
+        </p:txBody>
+      </p:sp>
+    </p:spTree>
+    <p:extLst>
+      <p:ext uri="{BB962C8B-B14F-4D97-AF65-F5344CB8AC3E}">
+        <p14:creationId xmlns:p14="http://schemas.microsoft.com/office/powerpoint/2010/main" val="1036006405"/>
+      </p:ext>
+    </p:extLst>
+  </p:cSld>
+  <p:clrMapOvr>
+    <a:masterClrMapping/>
+  </p:clrMapOvr>
+  <mc:AlternateContent xmlns:mc="http://schemas.openxmlformats.org/markup-compatibility/2006" xmlns:p14="http://schemas.microsoft.com/office/powerpoint/2010/main">
+    <mc:Choice Requires="p14">
+      <p:transition spd="med" p14:dur="700">
+        <p:fade/>
+      </p:transition>
+    </mc:Choice>
+    <mc:Fallback xmlns="">
+      <p:transition spd="med">
+        <p:fade/>
+      </p:transition>
+    </mc:Fallback>
+  </mc:AlternateContent>
+  <p:timing>
+    <p:tnLst>
+      <p:par>
+        <p:cTn id="1" dur="indefinite" restart="never" nodeType="tmRoot"/>
+      </p:par>
+    </p:tnLst>
+  </p:timing>
+</p:sld>
+</file>
+
+<file path=ppt/slides/slide50.xml><?xml version="1.0" encoding="utf-8"?>
 <p:sld xmlns:a="http://schemas.openxmlformats.org/drawingml/2006/main" xmlns:r="http://schemas.openxmlformats.org/officeDocument/2006/relationships" xmlns:p="http://schemas.openxmlformats.org/presentationml/2006/main">
   <p:cSld>
     <p:spTree>
@@ -22272,13 +22217,13 @@
   <p:clrMapOvr>
     <a:masterClrMapping/>
   </p:clrMapOvr>
-  <mc:AlternateContent xmlns:mc="http://schemas.openxmlformats.org/markup-compatibility/2006">
-    <mc:Choice xmlns:p14="http://schemas.microsoft.com/office/powerpoint/2010/main" Requires="p14">
+  <mc:AlternateContent xmlns:mc="http://schemas.openxmlformats.org/markup-compatibility/2006" xmlns:p14="http://schemas.microsoft.com/office/powerpoint/2010/main">
+    <mc:Choice Requires="p14">
       <p:transition spd="med" p14:dur="700">
         <p:fade/>
       </p:transition>
     </mc:Choice>
-    <mc:Fallback>
+    <mc:Fallback xmlns="">
       <p:transition spd="med">
         <p:fade/>
       </p:transition>
@@ -22294,7 +22239,7 @@
 </p:sld>
 </file>
 
-<file path=ppt/slides/slide52.xml><?xml version="1.0" encoding="utf-8"?>
+<file path=ppt/slides/slide51.xml><?xml version="1.0" encoding="utf-8"?>
 <p:sld xmlns:a="http://schemas.openxmlformats.org/drawingml/2006/main" xmlns:r="http://schemas.openxmlformats.org/officeDocument/2006/relationships" xmlns:p="http://schemas.openxmlformats.org/presentationml/2006/main">
   <p:cSld>
     <p:spTree>
@@ -22975,7 +22920,1081 @@
 </p:sld>
 </file>
 
+<file path=ppt/slides/slide52.xml><?xml version="1.0" encoding="utf-8"?>
+<p:sld xmlns:a="http://schemas.openxmlformats.org/drawingml/2006/main" xmlns:r="http://schemas.openxmlformats.org/officeDocument/2006/relationships" xmlns:p="http://schemas.openxmlformats.org/presentationml/2006/main">
+  <p:cSld>
+    <p:spTree>
+      <p:nvGrpSpPr>
+        <p:cNvPr id="1" name=""/>
+        <p:cNvGrpSpPr/>
+        <p:nvPr/>
+      </p:nvGrpSpPr>
+      <p:grpSpPr>
+        <a:xfrm>
+          <a:off x="0" y="0"/>
+          <a:ext cx="0" cy="0"/>
+          <a:chOff x="0" y="0"/>
+          <a:chExt cx="0" cy="0"/>
+        </a:xfrm>
+      </p:grpSpPr>
+      <p:pic>
+        <p:nvPicPr>
+          <p:cNvPr id="5" name="Imagem 4"/>
+          <p:cNvPicPr>
+            <a:picLocks noChangeAspect="1"/>
+          </p:cNvPicPr>
+          <p:nvPr/>
+        </p:nvPicPr>
+        <p:blipFill>
+          <a:blip r:embed="rId3">
+            <a:extLst>
+              <a:ext uri="{28A0092B-C50C-407E-A947-70E740481C1C}">
+                <a14:useLocalDpi xmlns:a14="http://schemas.microsoft.com/office/drawing/2010/main" val="0"/>
+              </a:ext>
+            </a:extLst>
+          </a:blip>
+          <a:stretch>
+            <a:fillRect/>
+          </a:stretch>
+        </p:blipFill>
+        <p:spPr>
+          <a:xfrm>
+            <a:off x="10338233" y="4949204"/>
+            <a:ext cx="1513115" cy="1573040"/>
+          </a:xfrm>
+          <a:prstGeom prst="rect">
+            <a:avLst/>
+          </a:prstGeom>
+          <a:solidFill>
+            <a:schemeClr val="accent2"/>
+          </a:solidFill>
+        </p:spPr>
+      </p:pic>
+      <p:sp>
+        <p:nvSpPr>
+          <p:cNvPr id="7" name="Título 1"/>
+          <p:cNvSpPr>
+            <a:spLocks noGrp="1"/>
+          </p:cNvSpPr>
+          <p:nvPr>
+            <p:ph type="title"/>
+          </p:nvPr>
+        </p:nvSpPr>
+        <p:spPr>
+          <a:xfrm>
+            <a:off x="838200" y="365125"/>
+            <a:ext cx="10515600" cy="1325563"/>
+          </a:xfrm>
+        </p:spPr>
+        <p:txBody>
+          <a:bodyPr>
+            <a:normAutofit/>
+          </a:bodyPr>
+          <a:lstStyle/>
+          <a:p>
+            <a:pPr algn="ctr"/>
+            <a:r>
+              <a:rPr lang="pt-BR" sz="4800" dirty="0" smtClean="0">
+                <a:solidFill>
+                  <a:schemeClr val="bg1"/>
+                </a:solidFill>
+                <a:latin typeface="KiloGram" pitchFamily="50" charset="0"/>
+              </a:rPr>
+              <a:t>CASO DE TESTE</a:t>
+            </a:r>
+            <a:endParaRPr lang="pt-BR" sz="4800" dirty="0">
+              <a:solidFill>
+                <a:schemeClr val="bg1"/>
+              </a:solidFill>
+              <a:latin typeface="KiloGram" pitchFamily="50" charset="0"/>
+            </a:endParaRPr>
+          </a:p>
+        </p:txBody>
+      </p:sp>
+      <p:sp>
+        <p:nvSpPr>
+          <p:cNvPr id="8" name="Espaço Reservado para Conteúdo 2"/>
+          <p:cNvSpPr>
+            <a:spLocks noGrp="1"/>
+          </p:cNvSpPr>
+          <p:nvPr>
+            <p:ph idx="1"/>
+          </p:nvPr>
+        </p:nvSpPr>
+        <p:spPr>
+          <a:xfrm>
+            <a:off x="838200" y="1825625"/>
+            <a:ext cx="10515600" cy="4351338"/>
+          </a:xfrm>
+        </p:spPr>
+        <p:txBody>
+          <a:bodyPr/>
+          <a:lstStyle/>
+          <a:p>
+            <a:pPr marL="0" indent="0">
+              <a:buNone/>
+            </a:pPr>
+            <a:r>
+              <a:rPr lang="pt-BR" i="1" dirty="0" smtClean="0">
+                <a:solidFill>
+                  <a:schemeClr val="bg1"/>
+                </a:solidFill>
+              </a:rPr>
+              <a:t>“O </a:t>
+            </a:r>
+            <a:r>
+              <a:rPr lang="pt-BR" i="1" dirty="0">
+                <a:solidFill>
+                  <a:schemeClr val="bg1"/>
+                </a:solidFill>
+              </a:rPr>
+              <a:t>caso de teste deve especificar a saída esperada e os resultados esperados do processamento</a:t>
+            </a:r>
+            <a:r>
+              <a:rPr lang="pt-BR" i="1" dirty="0" smtClean="0">
+                <a:solidFill>
+                  <a:schemeClr val="bg1"/>
+                </a:solidFill>
+              </a:rPr>
+              <a:t>.“</a:t>
+            </a:r>
+            <a:endParaRPr lang="pt-BR" i="1" dirty="0">
+              <a:solidFill>
+                <a:schemeClr val="bg1"/>
+              </a:solidFill>
+              <a:latin typeface="Arial" panose="020B0604020202020204" pitchFamily="34" charset="0"/>
+              <a:cs typeface="Arial" panose="020B0604020202020204" pitchFamily="34" charset="0"/>
+            </a:endParaRPr>
+          </a:p>
+        </p:txBody>
+      </p:sp>
+    </p:spTree>
+    <p:extLst>
+      <p:ext uri="{BB962C8B-B14F-4D97-AF65-F5344CB8AC3E}">
+        <p14:creationId xmlns:p14="http://schemas.microsoft.com/office/powerpoint/2010/main" val="4125400256"/>
+      </p:ext>
+    </p:extLst>
+  </p:cSld>
+  <p:clrMapOvr>
+    <a:masterClrMapping/>
+  </p:clrMapOvr>
+  <mc:AlternateContent xmlns:mc="http://schemas.openxmlformats.org/markup-compatibility/2006" xmlns:p14="http://schemas.microsoft.com/office/powerpoint/2010/main">
+    <mc:Choice Requires="p14">
+      <p:transition spd="med" p14:dur="700">
+        <p:fade/>
+      </p:transition>
+    </mc:Choice>
+    <mc:Fallback xmlns="">
+      <p:transition spd="med">
+        <p:fade/>
+      </p:transition>
+    </mc:Fallback>
+  </mc:AlternateContent>
+  <p:timing>
+    <p:tnLst>
+      <p:par>
+        <p:cTn id="1" dur="indefinite" restart="never" nodeType="tmRoot"/>
+      </p:par>
+    </p:tnLst>
+  </p:timing>
+</p:sld>
+</file>
+
 <file path=ppt/slides/slide53.xml><?xml version="1.0" encoding="utf-8"?>
+<p:sld xmlns:a="http://schemas.openxmlformats.org/drawingml/2006/main" xmlns:r="http://schemas.openxmlformats.org/officeDocument/2006/relationships" xmlns:p="http://schemas.openxmlformats.org/presentationml/2006/main">
+  <p:cSld>
+    <p:spTree>
+      <p:nvGrpSpPr>
+        <p:cNvPr id="1" name=""/>
+        <p:cNvGrpSpPr/>
+        <p:nvPr/>
+      </p:nvGrpSpPr>
+      <p:grpSpPr>
+        <a:xfrm>
+          <a:off x="0" y="0"/>
+          <a:ext cx="0" cy="0"/>
+          <a:chOff x="0" y="0"/>
+          <a:chExt cx="0" cy="0"/>
+        </a:xfrm>
+      </p:grpSpPr>
+      <p:pic>
+        <p:nvPicPr>
+          <p:cNvPr id="5" name="Imagem 4"/>
+          <p:cNvPicPr>
+            <a:picLocks noChangeAspect="1"/>
+          </p:cNvPicPr>
+          <p:nvPr/>
+        </p:nvPicPr>
+        <p:blipFill>
+          <a:blip r:embed="rId3">
+            <a:extLst>
+              <a:ext uri="{28A0092B-C50C-407E-A947-70E740481C1C}">
+                <a14:useLocalDpi xmlns:a14="http://schemas.microsoft.com/office/drawing/2010/main" val="0"/>
+              </a:ext>
+            </a:extLst>
+          </a:blip>
+          <a:stretch>
+            <a:fillRect/>
+          </a:stretch>
+        </p:blipFill>
+        <p:spPr>
+          <a:xfrm>
+            <a:off x="10338233" y="4949204"/>
+            <a:ext cx="1513115" cy="1573040"/>
+          </a:xfrm>
+          <a:prstGeom prst="rect">
+            <a:avLst/>
+          </a:prstGeom>
+          <a:solidFill>
+            <a:schemeClr val="accent2"/>
+          </a:solidFill>
+        </p:spPr>
+      </p:pic>
+      <p:sp>
+        <p:nvSpPr>
+          <p:cNvPr id="7" name="Título 1"/>
+          <p:cNvSpPr>
+            <a:spLocks noGrp="1"/>
+          </p:cNvSpPr>
+          <p:nvPr>
+            <p:ph type="title"/>
+          </p:nvPr>
+        </p:nvSpPr>
+        <p:spPr>
+          <a:xfrm>
+            <a:off x="824948" y="0"/>
+            <a:ext cx="10515600" cy="1325563"/>
+          </a:xfrm>
+        </p:spPr>
+        <p:txBody>
+          <a:bodyPr>
+            <a:normAutofit/>
+          </a:bodyPr>
+          <a:lstStyle/>
+          <a:p>
+            <a:pPr algn="ctr"/>
+            <a:r>
+              <a:rPr lang="pt-BR" sz="4800" dirty="0" smtClean="0">
+                <a:solidFill>
+                  <a:schemeClr val="bg1"/>
+                </a:solidFill>
+                <a:latin typeface="KiloGram" pitchFamily="50" charset="0"/>
+              </a:rPr>
+              <a:t>CASO DE TESTE</a:t>
+            </a:r>
+            <a:endParaRPr lang="pt-BR" sz="4800" dirty="0">
+              <a:solidFill>
+                <a:schemeClr val="bg1"/>
+              </a:solidFill>
+              <a:latin typeface="KiloGram" pitchFamily="50" charset="0"/>
+            </a:endParaRPr>
+          </a:p>
+        </p:txBody>
+      </p:sp>
+      <p:graphicFrame>
+        <p:nvGraphicFramePr>
+          <p:cNvPr id="3" name="Espaço Reservado para Conteúdo 2"/>
+          <p:cNvGraphicFramePr>
+            <a:graphicFrameLocks noGrp="1"/>
+          </p:cNvGraphicFramePr>
+          <p:nvPr>
+            <p:ph idx="1"/>
+            <p:extLst>
+              <p:ext uri="{D42A27DB-BD31-4B8C-83A1-F6EECF244321}">
+                <p14:modId xmlns:p14="http://schemas.microsoft.com/office/powerpoint/2010/main" val="794580762"/>
+              </p:ext>
+            </p:extLst>
+          </p:nvPr>
+        </p:nvGraphicFramePr>
+        <p:xfrm>
+          <a:off x="0" y="1153432"/>
+          <a:ext cx="12192000" cy="5664812"/>
+        </p:xfrm>
+        <a:graphic>
+          <a:graphicData uri="http://schemas.openxmlformats.org/drawingml/2006/table">
+            <a:tbl>
+              <a:tblPr firstRow="1" firstCol="1" bandRow="1">
+                <a:tableStyleId>{5C22544A-7EE6-4342-B048-85BDC9FD1C3A}</a:tableStyleId>
+              </a:tblPr>
+              <a:tblGrid>
+                <a:gridCol w="6096000"/>
+                <a:gridCol w="6096000"/>
+              </a:tblGrid>
+              <a:tr h="2791477">
+                <a:tc>
+                  <a:txBody>
+                    <a:bodyPr/>
+                    <a:lstStyle/>
+                    <a:p>
+                      <a:pPr>
+                        <a:lnSpc>
+                          <a:spcPct val="107000"/>
+                        </a:lnSpc>
+                        <a:spcAft>
+                          <a:spcPts val="0"/>
+                        </a:spcAft>
+                      </a:pPr>
+                      <a:r>
+                        <a:rPr lang="pt-BR" sz="2200" dirty="0">
+                          <a:solidFill>
+                            <a:schemeClr val="bg1"/>
+                          </a:solidFill>
+                          <a:effectLst/>
+                        </a:rPr>
+                        <a:t>Procedimento</a:t>
+                      </a:r>
+                      <a:endParaRPr lang="pt-BR" sz="2200" dirty="0">
+                        <a:solidFill>
+                          <a:schemeClr val="bg1"/>
+                        </a:solidFill>
+                        <a:effectLst/>
+                        <a:latin typeface="Calibri" panose="020F0502020204030204" pitchFamily="34" charset="0"/>
+                        <a:ea typeface="Calibri" panose="020F0502020204030204" pitchFamily="34" charset="0"/>
+                        <a:cs typeface="Times New Roman" panose="02020603050405020304" pitchFamily="18" charset="0"/>
+                      </a:endParaRPr>
+                    </a:p>
+                  </a:txBody>
+                  <a:tcPr marL="68580" marR="68580" marT="0" marB="0">
+                    <a:solidFill>
+                      <a:schemeClr val="tx1">
+                        <a:lumMod val="95000"/>
+                        <a:lumOff val="5000"/>
+                      </a:schemeClr>
+                    </a:solidFill>
+                  </a:tcPr>
+                </a:tc>
+                <a:tc>
+                  <a:txBody>
+                    <a:bodyPr/>
+                    <a:lstStyle/>
+                    <a:p>
+                      <a:pPr>
+                        <a:lnSpc>
+                          <a:spcPct val="107000"/>
+                        </a:lnSpc>
+                        <a:spcAft>
+                          <a:spcPts val="0"/>
+                        </a:spcAft>
+                      </a:pPr>
+                      <a:r>
+                        <a:rPr lang="pt-BR" sz="2200" dirty="0">
+                          <a:solidFill>
+                            <a:schemeClr val="bg1"/>
+                          </a:solidFill>
+                          <a:effectLst/>
+                        </a:rPr>
+                        <a:t>1)  O ator informa um campo de forma inválida.</a:t>
+                      </a:r>
+                    </a:p>
+                    <a:p>
+                      <a:pPr>
+                        <a:lnSpc>
+                          <a:spcPct val="107000"/>
+                        </a:lnSpc>
+                        <a:spcAft>
+                          <a:spcPts val="0"/>
+                        </a:spcAft>
+                      </a:pPr>
+                      <a:r>
+                        <a:rPr lang="pt-BR" sz="2200" dirty="0">
+                          <a:solidFill>
+                            <a:schemeClr val="bg1"/>
+                          </a:solidFill>
+                          <a:effectLst/>
+                        </a:rPr>
+                        <a:t>2) O ator seleciona a opção salvar.</a:t>
+                      </a:r>
+                    </a:p>
+                    <a:p>
+                      <a:pPr>
+                        <a:lnSpc>
+                          <a:spcPct val="107000"/>
+                        </a:lnSpc>
+                        <a:spcAft>
+                          <a:spcPts val="0"/>
+                        </a:spcAft>
+                      </a:pPr>
+                      <a:r>
+                        <a:rPr lang="pt-BR" sz="2200" dirty="0">
+                          <a:solidFill>
+                            <a:schemeClr val="bg1"/>
+                          </a:solidFill>
+                          <a:effectLst/>
+                        </a:rPr>
+                        <a:t>3) O sistema verifica se os campos obrigatórios forma preenchidos.</a:t>
+                      </a:r>
+                    </a:p>
+                    <a:p>
+                      <a:pPr>
+                        <a:lnSpc>
+                          <a:spcPct val="107000"/>
+                        </a:lnSpc>
+                        <a:spcAft>
+                          <a:spcPts val="0"/>
+                        </a:spcAft>
+                      </a:pPr>
+                      <a:r>
+                        <a:rPr lang="pt-BR" sz="2200" dirty="0">
+                          <a:solidFill>
+                            <a:schemeClr val="bg1"/>
+                          </a:solidFill>
+                          <a:effectLst/>
+                        </a:rPr>
+                        <a:t>4) O sistema verifica se a pessoa está cadastrada no sistema.</a:t>
+                      </a:r>
+                    </a:p>
+                    <a:p>
+                      <a:pPr>
+                        <a:lnSpc>
+                          <a:spcPct val="107000"/>
+                        </a:lnSpc>
+                        <a:spcAft>
+                          <a:spcPts val="0"/>
+                        </a:spcAft>
+                      </a:pPr>
+                      <a:r>
+                        <a:rPr lang="pt-BR" sz="2200" dirty="0">
+                          <a:solidFill>
+                            <a:schemeClr val="bg1"/>
+                          </a:solidFill>
+                          <a:effectLst/>
+                        </a:rPr>
+                        <a:t>5) O sistema exibe a mensagem de campo “nome do campo” inválido.</a:t>
+                      </a:r>
+                    </a:p>
+                    <a:p>
+                      <a:pPr>
+                        <a:lnSpc>
+                          <a:spcPct val="107000"/>
+                        </a:lnSpc>
+                        <a:spcAft>
+                          <a:spcPts val="0"/>
+                        </a:spcAft>
+                      </a:pPr>
+                      <a:r>
+                        <a:rPr lang="pt-BR" sz="2200" dirty="0">
+                          <a:solidFill>
+                            <a:schemeClr val="bg1"/>
+                          </a:solidFill>
+                          <a:effectLst/>
+                        </a:rPr>
+                        <a:t> </a:t>
+                      </a:r>
+                      <a:endParaRPr lang="pt-BR" sz="2200" dirty="0">
+                        <a:solidFill>
+                          <a:schemeClr val="bg1"/>
+                        </a:solidFill>
+                        <a:effectLst/>
+                        <a:latin typeface="Calibri" panose="020F0502020204030204" pitchFamily="34" charset="0"/>
+                        <a:ea typeface="Calibri" panose="020F0502020204030204" pitchFamily="34" charset="0"/>
+                        <a:cs typeface="Times New Roman" panose="02020603050405020304" pitchFamily="18" charset="0"/>
+                      </a:endParaRPr>
+                    </a:p>
+                  </a:txBody>
+                  <a:tcPr marL="68580" marR="68580" marT="0" marB="0">
+                    <a:solidFill>
+                      <a:schemeClr val="tx1">
+                        <a:lumMod val="95000"/>
+                        <a:lumOff val="5000"/>
+                      </a:schemeClr>
+                    </a:solidFill>
+                  </a:tcPr>
+                </a:tc>
+              </a:tr>
+              <a:tr h="297864">
+                <a:tc>
+                  <a:txBody>
+                    <a:bodyPr/>
+                    <a:lstStyle/>
+                    <a:p>
+                      <a:pPr>
+                        <a:lnSpc>
+                          <a:spcPct val="107000"/>
+                        </a:lnSpc>
+                        <a:spcAft>
+                          <a:spcPts val="0"/>
+                        </a:spcAft>
+                      </a:pPr>
+                      <a:r>
+                        <a:rPr lang="pt-BR" sz="2200">
+                          <a:solidFill>
+                            <a:schemeClr val="bg1"/>
+                          </a:solidFill>
+                          <a:effectLst/>
+                        </a:rPr>
+                        <a:t>Resultado esperado</a:t>
+                      </a:r>
+                      <a:endParaRPr lang="pt-BR" sz="2200">
+                        <a:solidFill>
+                          <a:schemeClr val="bg1"/>
+                        </a:solidFill>
+                        <a:effectLst/>
+                        <a:latin typeface="Calibri" panose="020F0502020204030204" pitchFamily="34" charset="0"/>
+                        <a:ea typeface="Calibri" panose="020F0502020204030204" pitchFamily="34" charset="0"/>
+                        <a:cs typeface="Times New Roman" panose="02020603050405020304" pitchFamily="18" charset="0"/>
+                      </a:endParaRPr>
+                    </a:p>
+                  </a:txBody>
+                  <a:tcPr marL="68580" marR="68580" marT="0" marB="0">
+                    <a:solidFill>
+                      <a:schemeClr val="tx1">
+                        <a:lumMod val="95000"/>
+                        <a:lumOff val="5000"/>
+                      </a:schemeClr>
+                    </a:solidFill>
+                  </a:tcPr>
+                </a:tc>
+                <a:tc>
+                  <a:txBody>
+                    <a:bodyPr/>
+                    <a:lstStyle/>
+                    <a:p>
+                      <a:pPr>
+                        <a:lnSpc>
+                          <a:spcPct val="107000"/>
+                        </a:lnSpc>
+                        <a:spcAft>
+                          <a:spcPts val="0"/>
+                        </a:spcAft>
+                      </a:pPr>
+                      <a:r>
+                        <a:rPr lang="pt-BR" sz="2200" dirty="0">
+                          <a:solidFill>
+                            <a:schemeClr val="bg1"/>
+                          </a:solidFill>
+                          <a:effectLst/>
+                        </a:rPr>
+                        <a:t>Mensagem de erro do sistema</a:t>
+                      </a:r>
+                      <a:endParaRPr lang="pt-BR" sz="2200" dirty="0">
+                        <a:solidFill>
+                          <a:schemeClr val="bg1"/>
+                        </a:solidFill>
+                        <a:effectLst/>
+                        <a:latin typeface="Calibri" panose="020F0502020204030204" pitchFamily="34" charset="0"/>
+                        <a:ea typeface="Calibri" panose="020F0502020204030204" pitchFamily="34" charset="0"/>
+                        <a:cs typeface="Times New Roman" panose="02020603050405020304" pitchFamily="18" charset="0"/>
+                      </a:endParaRPr>
+                    </a:p>
+                  </a:txBody>
+                  <a:tcPr marL="68580" marR="68580" marT="0" marB="0">
+                    <a:solidFill>
+                      <a:schemeClr val="tx1">
+                        <a:lumMod val="95000"/>
+                        <a:lumOff val="5000"/>
+                      </a:schemeClr>
+                    </a:solidFill>
+                  </a:tcPr>
+                </a:tc>
+              </a:tr>
+              <a:tr h="1080112">
+                <a:tc>
+                  <a:txBody>
+                    <a:bodyPr/>
+                    <a:lstStyle/>
+                    <a:p>
+                      <a:pPr>
+                        <a:lnSpc>
+                          <a:spcPct val="107000"/>
+                        </a:lnSpc>
+                        <a:spcAft>
+                          <a:spcPts val="0"/>
+                        </a:spcAft>
+                      </a:pPr>
+                      <a:r>
+                        <a:rPr lang="pt-BR" sz="2200" dirty="0">
+                          <a:solidFill>
+                            <a:schemeClr val="bg1"/>
+                          </a:solidFill>
+                          <a:effectLst/>
+                        </a:rPr>
+                        <a:t>Dados de entrada</a:t>
+                      </a:r>
+                      <a:endParaRPr lang="pt-BR" sz="2200" dirty="0">
+                        <a:solidFill>
+                          <a:schemeClr val="bg1"/>
+                        </a:solidFill>
+                        <a:effectLst/>
+                        <a:latin typeface="Calibri" panose="020F0502020204030204" pitchFamily="34" charset="0"/>
+                        <a:ea typeface="Calibri" panose="020F0502020204030204" pitchFamily="34" charset="0"/>
+                        <a:cs typeface="Times New Roman" panose="02020603050405020304" pitchFamily="18" charset="0"/>
+                      </a:endParaRPr>
+                    </a:p>
+                  </a:txBody>
+                  <a:tcPr marL="68580" marR="68580" marT="0" marB="0">
+                    <a:solidFill>
+                      <a:schemeClr val="tx1">
+                        <a:lumMod val="95000"/>
+                        <a:lumOff val="5000"/>
+                      </a:schemeClr>
+                    </a:solidFill>
+                  </a:tcPr>
+                </a:tc>
+                <a:tc>
+                  <a:txBody>
+                    <a:bodyPr/>
+                    <a:lstStyle/>
+                    <a:p>
+                      <a:pPr>
+                        <a:lnSpc>
+                          <a:spcPct val="107000"/>
+                        </a:lnSpc>
+                        <a:spcAft>
+                          <a:spcPts val="0"/>
+                        </a:spcAft>
+                      </a:pPr>
+                      <a:r>
+                        <a:rPr lang="pt-BR" sz="2200" dirty="0">
+                          <a:solidFill>
+                            <a:schemeClr val="bg1"/>
+                          </a:solidFill>
+                          <a:effectLst/>
+                        </a:rPr>
+                        <a:t>Qualquer dos campos seguintes inválido: nome, RG, CPF, telefone, e-mail, data de nascimento, endereço.</a:t>
+                      </a:r>
+                    </a:p>
+                    <a:p>
+                      <a:pPr>
+                        <a:lnSpc>
+                          <a:spcPct val="107000"/>
+                        </a:lnSpc>
+                        <a:spcAft>
+                          <a:spcPts val="0"/>
+                        </a:spcAft>
+                      </a:pPr>
+                      <a:r>
+                        <a:rPr lang="pt-BR" sz="2200" dirty="0">
+                          <a:solidFill>
+                            <a:schemeClr val="bg1"/>
+                          </a:solidFill>
+                          <a:effectLst/>
+                        </a:rPr>
+                        <a:t> </a:t>
+                      </a:r>
+                      <a:endParaRPr lang="pt-BR" sz="2200" dirty="0">
+                        <a:solidFill>
+                          <a:schemeClr val="bg1"/>
+                        </a:solidFill>
+                        <a:effectLst/>
+                        <a:latin typeface="Calibri" panose="020F0502020204030204" pitchFamily="34" charset="0"/>
+                        <a:ea typeface="Calibri" panose="020F0502020204030204" pitchFamily="34" charset="0"/>
+                        <a:cs typeface="Times New Roman" panose="02020603050405020304" pitchFamily="18" charset="0"/>
+                      </a:endParaRPr>
+                    </a:p>
+                  </a:txBody>
+                  <a:tcPr marL="68580" marR="68580" marT="0" marB="0">
+                    <a:solidFill>
+                      <a:schemeClr val="tx1">
+                        <a:lumMod val="95000"/>
+                        <a:lumOff val="5000"/>
+                      </a:schemeClr>
+                    </a:solidFill>
+                  </a:tcPr>
+                </a:tc>
+              </a:tr>
+              <a:tr h="297864">
+                <a:tc>
+                  <a:txBody>
+                    <a:bodyPr/>
+                    <a:lstStyle/>
+                    <a:p>
+                      <a:pPr>
+                        <a:lnSpc>
+                          <a:spcPct val="107000"/>
+                        </a:lnSpc>
+                        <a:spcAft>
+                          <a:spcPts val="0"/>
+                        </a:spcAft>
+                      </a:pPr>
+                      <a:r>
+                        <a:rPr lang="pt-BR" sz="2200" dirty="0">
+                          <a:solidFill>
+                            <a:schemeClr val="bg1"/>
+                          </a:solidFill>
+                          <a:effectLst/>
+                        </a:rPr>
+                        <a:t>Ambiente</a:t>
+                      </a:r>
+                      <a:endParaRPr lang="pt-BR" sz="2200" dirty="0">
+                        <a:solidFill>
+                          <a:schemeClr val="bg1"/>
+                        </a:solidFill>
+                        <a:effectLst/>
+                        <a:latin typeface="Calibri" panose="020F0502020204030204" pitchFamily="34" charset="0"/>
+                        <a:ea typeface="Calibri" panose="020F0502020204030204" pitchFamily="34" charset="0"/>
+                        <a:cs typeface="Times New Roman" panose="02020603050405020304" pitchFamily="18" charset="0"/>
+                      </a:endParaRPr>
+                    </a:p>
+                  </a:txBody>
+                  <a:tcPr marL="68580" marR="68580" marT="0" marB="0">
+                    <a:solidFill>
+                      <a:schemeClr val="tx1">
+                        <a:lumMod val="95000"/>
+                        <a:lumOff val="5000"/>
+                      </a:schemeClr>
+                    </a:solidFill>
+                  </a:tcPr>
+                </a:tc>
+                <a:tc>
+                  <a:txBody>
+                    <a:bodyPr/>
+                    <a:lstStyle/>
+                    <a:p>
+                      <a:pPr>
+                        <a:lnSpc>
+                          <a:spcPct val="107000"/>
+                        </a:lnSpc>
+                        <a:spcAft>
+                          <a:spcPts val="0"/>
+                        </a:spcAft>
+                      </a:pPr>
+                      <a:r>
+                        <a:rPr lang="pt-BR" sz="2200" dirty="0">
+                          <a:solidFill>
+                            <a:schemeClr val="bg1"/>
+                          </a:solidFill>
+                          <a:effectLst/>
+                        </a:rPr>
+                        <a:t>Windows 8.1, banco MySQL, IDE </a:t>
+                      </a:r>
+                      <a:r>
+                        <a:rPr lang="pt-BR" sz="2200" dirty="0" err="1">
+                          <a:solidFill>
+                            <a:schemeClr val="bg1"/>
+                          </a:solidFill>
+                          <a:effectLst/>
+                        </a:rPr>
+                        <a:t>Netbens</a:t>
+                      </a:r>
+                      <a:r>
+                        <a:rPr lang="pt-BR" sz="2200" dirty="0">
+                          <a:solidFill>
+                            <a:schemeClr val="bg1"/>
+                          </a:solidFill>
+                          <a:effectLst/>
+                        </a:rPr>
+                        <a:t>.</a:t>
+                      </a:r>
+                      <a:endParaRPr lang="pt-BR" sz="2200" dirty="0">
+                        <a:solidFill>
+                          <a:schemeClr val="bg1"/>
+                        </a:solidFill>
+                        <a:effectLst/>
+                        <a:latin typeface="Calibri" panose="020F0502020204030204" pitchFamily="34" charset="0"/>
+                        <a:ea typeface="Calibri" panose="020F0502020204030204" pitchFamily="34" charset="0"/>
+                        <a:cs typeface="Times New Roman" panose="02020603050405020304" pitchFamily="18" charset="0"/>
+                      </a:endParaRPr>
+                    </a:p>
+                  </a:txBody>
+                  <a:tcPr marL="68580" marR="68580" marT="0" marB="0">
+                    <a:solidFill>
+                      <a:schemeClr val="tx1">
+                        <a:lumMod val="95000"/>
+                        <a:lumOff val="5000"/>
+                      </a:schemeClr>
+                    </a:solidFill>
+                  </a:tcPr>
+                </a:tc>
+              </a:tr>
+              <a:tr h="297864">
+                <a:tc>
+                  <a:txBody>
+                    <a:bodyPr/>
+                    <a:lstStyle/>
+                    <a:p>
+                      <a:pPr>
+                        <a:lnSpc>
+                          <a:spcPct val="107000"/>
+                        </a:lnSpc>
+                        <a:spcAft>
+                          <a:spcPts val="0"/>
+                        </a:spcAft>
+                      </a:pPr>
+                      <a:r>
+                        <a:rPr lang="pt-BR" sz="2200">
+                          <a:solidFill>
+                            <a:schemeClr val="bg1"/>
+                          </a:solidFill>
+                          <a:effectLst/>
+                        </a:rPr>
+                        <a:t>Implementação</a:t>
+                      </a:r>
+                      <a:endParaRPr lang="pt-BR" sz="2200">
+                        <a:solidFill>
+                          <a:schemeClr val="bg1"/>
+                        </a:solidFill>
+                        <a:effectLst/>
+                        <a:latin typeface="Calibri" panose="020F0502020204030204" pitchFamily="34" charset="0"/>
+                        <a:ea typeface="Calibri" panose="020F0502020204030204" pitchFamily="34" charset="0"/>
+                        <a:cs typeface="Times New Roman" panose="02020603050405020304" pitchFamily="18" charset="0"/>
+                      </a:endParaRPr>
+                    </a:p>
+                  </a:txBody>
+                  <a:tcPr marL="68580" marR="68580" marT="0" marB="0">
+                    <a:solidFill>
+                      <a:schemeClr val="tx1">
+                        <a:lumMod val="95000"/>
+                        <a:lumOff val="5000"/>
+                      </a:schemeClr>
+                    </a:solidFill>
+                  </a:tcPr>
+                </a:tc>
+                <a:tc>
+                  <a:txBody>
+                    <a:bodyPr/>
+                    <a:lstStyle/>
+                    <a:p>
+                      <a:pPr>
+                        <a:lnSpc>
+                          <a:spcPct val="107000"/>
+                        </a:lnSpc>
+                        <a:spcAft>
+                          <a:spcPts val="0"/>
+                        </a:spcAft>
+                      </a:pPr>
+                      <a:r>
+                        <a:rPr lang="pt-BR" sz="2200" dirty="0">
+                          <a:solidFill>
+                            <a:schemeClr val="bg1"/>
+                          </a:solidFill>
+                          <a:effectLst/>
+                        </a:rPr>
+                        <a:t>Manual</a:t>
+                      </a:r>
+                      <a:endParaRPr lang="pt-BR" sz="2200" dirty="0">
+                        <a:solidFill>
+                          <a:schemeClr val="bg1"/>
+                        </a:solidFill>
+                        <a:effectLst/>
+                        <a:latin typeface="Calibri" panose="020F0502020204030204" pitchFamily="34" charset="0"/>
+                        <a:ea typeface="Calibri" panose="020F0502020204030204" pitchFamily="34" charset="0"/>
+                        <a:cs typeface="Times New Roman" panose="02020603050405020304" pitchFamily="18" charset="0"/>
+                      </a:endParaRPr>
+                    </a:p>
+                  </a:txBody>
+                  <a:tcPr marL="68580" marR="68580" marT="0" marB="0">
+                    <a:solidFill>
+                      <a:schemeClr val="tx1">
+                        <a:lumMod val="95000"/>
+                        <a:lumOff val="5000"/>
+                      </a:schemeClr>
+                    </a:solidFill>
+                  </a:tcPr>
+                </a:tc>
+              </a:tr>
+              <a:tr h="297864">
+                <a:tc>
+                  <a:txBody>
+                    <a:bodyPr/>
+                    <a:lstStyle/>
+                    <a:p>
+                      <a:pPr>
+                        <a:lnSpc>
+                          <a:spcPct val="107000"/>
+                        </a:lnSpc>
+                        <a:spcAft>
+                          <a:spcPts val="0"/>
+                        </a:spcAft>
+                      </a:pPr>
+                      <a:r>
+                        <a:rPr lang="pt-BR" sz="2200">
+                          <a:solidFill>
+                            <a:schemeClr val="bg1"/>
+                          </a:solidFill>
+                          <a:effectLst/>
+                        </a:rPr>
+                        <a:t>Iteração</a:t>
+                      </a:r>
+                      <a:endParaRPr lang="pt-BR" sz="2200">
+                        <a:solidFill>
+                          <a:schemeClr val="bg1"/>
+                        </a:solidFill>
+                        <a:effectLst/>
+                        <a:latin typeface="Calibri" panose="020F0502020204030204" pitchFamily="34" charset="0"/>
+                        <a:ea typeface="Calibri" panose="020F0502020204030204" pitchFamily="34" charset="0"/>
+                        <a:cs typeface="Times New Roman" panose="02020603050405020304" pitchFamily="18" charset="0"/>
+                      </a:endParaRPr>
+                    </a:p>
+                  </a:txBody>
+                  <a:tcPr marL="68580" marR="68580" marT="0" marB="0">
+                    <a:solidFill>
+                      <a:schemeClr val="tx1">
+                        <a:lumMod val="95000"/>
+                        <a:lumOff val="5000"/>
+                      </a:schemeClr>
+                    </a:solidFill>
+                  </a:tcPr>
+                </a:tc>
+                <a:tc>
+                  <a:txBody>
+                    <a:bodyPr/>
+                    <a:lstStyle/>
+                    <a:p>
+                      <a:pPr>
+                        <a:lnSpc>
+                          <a:spcPct val="107000"/>
+                        </a:lnSpc>
+                        <a:spcAft>
+                          <a:spcPts val="0"/>
+                        </a:spcAft>
+                      </a:pPr>
+                      <a:r>
+                        <a:rPr lang="pt-BR" sz="2200" dirty="0">
+                          <a:solidFill>
+                            <a:schemeClr val="bg1"/>
+                          </a:solidFill>
+                          <a:effectLst/>
+                        </a:rPr>
+                        <a:t>1 Iteração</a:t>
+                      </a:r>
+                      <a:endParaRPr lang="pt-BR" sz="2200" dirty="0">
+                        <a:solidFill>
+                          <a:schemeClr val="bg1"/>
+                        </a:solidFill>
+                        <a:effectLst/>
+                        <a:latin typeface="Calibri" panose="020F0502020204030204" pitchFamily="34" charset="0"/>
+                        <a:ea typeface="Calibri" panose="020F0502020204030204" pitchFamily="34" charset="0"/>
+                        <a:cs typeface="Times New Roman" panose="02020603050405020304" pitchFamily="18" charset="0"/>
+                      </a:endParaRPr>
+                    </a:p>
+                  </a:txBody>
+                  <a:tcPr marL="68580" marR="68580" marT="0" marB="0">
+                    <a:solidFill>
+                      <a:schemeClr val="tx1">
+                        <a:lumMod val="95000"/>
+                        <a:lumOff val="5000"/>
+                      </a:schemeClr>
+                    </a:solidFill>
+                  </a:tcPr>
+                </a:tc>
+              </a:tr>
+            </a:tbl>
+          </a:graphicData>
+        </a:graphic>
+      </p:graphicFrame>
+    </p:spTree>
+    <p:extLst>
+      <p:ext uri="{BB962C8B-B14F-4D97-AF65-F5344CB8AC3E}">
+        <p14:creationId xmlns:p14="http://schemas.microsoft.com/office/powerpoint/2010/main" val="1805675242"/>
+      </p:ext>
+    </p:extLst>
+  </p:cSld>
+  <p:clrMapOvr>
+    <a:masterClrMapping/>
+  </p:clrMapOvr>
+  <mc:AlternateContent xmlns:mc="http://schemas.openxmlformats.org/markup-compatibility/2006">
+    <mc:Choice xmlns:p14="http://schemas.microsoft.com/office/powerpoint/2010/main" Requires="p14">
+      <p:transition spd="med" p14:dur="700">
+        <p:fade/>
+      </p:transition>
+    </mc:Choice>
+    <mc:Fallback>
+      <p:transition spd="med">
+        <p:fade/>
+      </p:transition>
+    </mc:Fallback>
+  </mc:AlternateContent>
+  <p:timing>
+    <p:tnLst>
+      <p:par>
+        <p:cTn id="1" dur="indefinite" restart="never" nodeType="tmRoot"/>
+      </p:par>
+    </p:tnLst>
+  </p:timing>
+</p:sld>
+</file>
+
+<file path=ppt/slides/slide54.xml><?xml version="1.0" encoding="utf-8"?>
+<p:sld xmlns:a="http://schemas.openxmlformats.org/drawingml/2006/main" xmlns:r="http://schemas.openxmlformats.org/officeDocument/2006/relationships" xmlns:p="http://schemas.openxmlformats.org/presentationml/2006/main">
+  <p:cSld>
+    <p:spTree>
+      <p:nvGrpSpPr>
+        <p:cNvPr id="1" name=""/>
+        <p:cNvGrpSpPr/>
+        <p:nvPr/>
+      </p:nvGrpSpPr>
+      <p:grpSpPr>
+        <a:xfrm>
+          <a:off x="0" y="0"/>
+          <a:ext cx="0" cy="0"/>
+          <a:chOff x="0" y="0"/>
+          <a:chExt cx="0" cy="0"/>
+        </a:xfrm>
+      </p:grpSpPr>
+      <p:sp>
+        <p:nvSpPr>
+          <p:cNvPr id="4" name="Título 1"/>
+          <p:cNvSpPr>
+            <a:spLocks noGrp="1"/>
+          </p:cNvSpPr>
+          <p:nvPr>
+            <p:ph type="title"/>
+          </p:nvPr>
+        </p:nvSpPr>
+        <p:spPr>
+          <a:xfrm>
+            <a:off x="434400" y="2765620"/>
+            <a:ext cx="11341100" cy="1325563"/>
+          </a:xfrm>
+        </p:spPr>
+        <p:txBody>
+          <a:bodyPr>
+            <a:normAutofit/>
+          </a:bodyPr>
+          <a:lstStyle/>
+          <a:p>
+            <a:pPr algn="ctr"/>
+            <a:r>
+              <a:rPr lang="pt-BR" sz="4800" dirty="0" smtClean="0">
+                <a:solidFill>
+                  <a:schemeClr val="bg1"/>
+                </a:solidFill>
+                <a:latin typeface="KiloGram" pitchFamily="50" charset="0"/>
+              </a:rPr>
+              <a:t>EXEMPLO</a:t>
+            </a:r>
+            <a:endParaRPr lang="pt-BR" sz="4800" dirty="0">
+              <a:solidFill>
+                <a:schemeClr val="bg1"/>
+              </a:solidFill>
+              <a:latin typeface="KiloGram" pitchFamily="50" charset="0"/>
+            </a:endParaRPr>
+          </a:p>
+        </p:txBody>
+      </p:sp>
+    </p:spTree>
+    <p:extLst>
+      <p:ext uri="{BB962C8B-B14F-4D97-AF65-F5344CB8AC3E}">
+        <p14:creationId xmlns:p14="http://schemas.microsoft.com/office/powerpoint/2010/main" val="2879458534"/>
+      </p:ext>
+    </p:extLst>
+  </p:cSld>
+  <p:clrMapOvr>
+    <a:masterClrMapping/>
+  </p:clrMapOvr>
+  <mc:AlternateContent xmlns:mc="http://schemas.openxmlformats.org/markup-compatibility/2006">
+    <mc:Choice xmlns:p14="http://schemas.microsoft.com/office/powerpoint/2010/main" Requires="p14">
+      <p:transition spd="med" p14:dur="700">
+        <p:fade/>
+      </p:transition>
+    </mc:Choice>
+    <mc:Fallback>
+      <p:transition spd="med">
+        <p:fade/>
+      </p:transition>
+    </mc:Fallback>
+  </mc:AlternateContent>
+  <p:timing>
+    <p:tnLst>
+      <p:par>
+        <p:cTn id="1" dur="indefinite" restart="never" nodeType="tmRoot"/>
+      </p:par>
+    </p:tnLst>
+  </p:timing>
+</p:sld>
+</file>
+
+<file path=ppt/slides/slide55.xml><?xml version="1.0" encoding="utf-8"?>
 <p:sld xmlns:a="http://schemas.openxmlformats.org/drawingml/2006/main" xmlns:r="http://schemas.openxmlformats.org/officeDocument/2006/relationships" xmlns:p="http://schemas.openxmlformats.org/presentationml/2006/main">
   <p:cSld>
     <p:spTree>
@@ -23065,7 +24084,7 @@
 </p:sld>
 </file>
 
-<file path=ppt/slides/slide54.xml><?xml version="1.0" encoding="utf-8"?>
+<file path=ppt/slides/slide56.xml><?xml version="1.0" encoding="utf-8"?>
 <p:sld xmlns:a="http://schemas.openxmlformats.org/drawingml/2006/main" xmlns:r="http://schemas.openxmlformats.org/officeDocument/2006/relationships" xmlns:p="http://schemas.openxmlformats.org/presentationml/2006/main">
   <p:cSld>
     <p:spTree>
@@ -23460,7 +24479,7 @@
 </p:sld>
 </file>
 
-<file path=ppt/slides/slide55.xml><?xml version="1.0" encoding="utf-8"?>
+<file path=ppt/slides/slide57.xml><?xml version="1.0" encoding="utf-8"?>
 <p:sld xmlns:a="http://schemas.openxmlformats.org/drawingml/2006/main" xmlns:r="http://schemas.openxmlformats.org/officeDocument/2006/relationships" xmlns:p="http://schemas.openxmlformats.org/presentationml/2006/main">
   <p:cSld>
     <p:spTree>
@@ -23689,11 +24708,6 @@
               </a:rPr>
               <a:t>TESTE</a:t>
             </a:r>
-            <a:endParaRPr lang="pt-BR" dirty="0" smtClean="0">
-              <a:solidFill>
-                <a:schemeClr val="bg1"/>
-              </a:solidFill>
-            </a:endParaRPr>
           </a:p>
         </p:txBody>
       </p:sp>
@@ -23707,13 +24721,13 @@
   <p:clrMapOvr>
     <a:masterClrMapping/>
   </p:clrMapOvr>
-  <mc:AlternateContent xmlns:mc="http://schemas.openxmlformats.org/markup-compatibility/2006">
-    <mc:Choice xmlns:p14="http://schemas.microsoft.com/office/powerpoint/2010/main" Requires="p14">
+  <mc:AlternateContent xmlns:mc="http://schemas.openxmlformats.org/markup-compatibility/2006" xmlns:p14="http://schemas.microsoft.com/office/powerpoint/2010/main">
+    <mc:Choice Requires="p14">
       <p:transition spd="med" p14:dur="700">
         <p:fade/>
       </p:transition>
     </mc:Choice>
-    <mc:Fallback>
+    <mc:Fallback xmlns="">
       <p:transition spd="med">
         <p:fade/>
       </p:transition>
@@ -23876,15 +24890,7 @@
                   <a:schemeClr val="bg1"/>
                 </a:solidFill>
               </a:rPr>
-              <a:t>PROCESSO DE </a:t>
-            </a:r>
-            <a:r>
-              <a:rPr lang="pt-BR" dirty="0" smtClean="0">
-                <a:solidFill>
-                  <a:schemeClr val="bg1"/>
-                </a:solidFill>
-              </a:rPr>
-              <a:t>TESTE</a:t>
+              <a:t>PROCESSO DE TESTE</a:t>
             </a:r>
             <a:endParaRPr lang="pt-BR" dirty="0">
               <a:solidFill>
@@ -23904,13 +24910,13 @@
   <p:clrMapOvr>
     <a:masterClrMapping/>
   </p:clrMapOvr>
-  <mc:AlternateContent xmlns:mc="http://schemas.openxmlformats.org/markup-compatibility/2006">
-    <mc:Choice xmlns:p14="http://schemas.microsoft.com/office/powerpoint/2010/main" Requires="p14">
+  <mc:AlternateContent xmlns:mc="http://schemas.openxmlformats.org/markup-compatibility/2006" xmlns:p14="http://schemas.microsoft.com/office/powerpoint/2010/main">
+    <mc:Choice Requires="p14">
       <p:transition spd="med" p14:dur="700">
         <p:fade/>
       </p:transition>
     </mc:Choice>
-    <mc:Fallback>
+    <mc:Fallback xmlns="">
       <p:transition spd="med">
         <p:fade/>
       </p:transition>
@@ -24116,13 +25122,13 @@
   <p:clrMapOvr>
     <a:masterClrMapping/>
   </p:clrMapOvr>
-  <mc:AlternateContent xmlns:mc="http://schemas.openxmlformats.org/markup-compatibility/2006">
-    <mc:Choice xmlns:p14="http://schemas.microsoft.com/office/powerpoint/2010/main" Requires="p14">
+  <mc:AlternateContent xmlns:mc="http://schemas.openxmlformats.org/markup-compatibility/2006" xmlns:p14="http://schemas.microsoft.com/office/powerpoint/2010/main">
+    <mc:Choice Requires="p14">
       <p:transition spd="med" p14:dur="700">
         <p:fade/>
       </p:transition>
     </mc:Choice>
-    <mc:Fallback>
+    <mc:Fallback xmlns="">
       <p:transition spd="med">
         <p:fade/>
       </p:transition>
@@ -24330,13 +25336,13 @@
   <p:clrMapOvr>
     <a:masterClrMapping/>
   </p:clrMapOvr>
-  <mc:AlternateContent xmlns:mc="http://schemas.openxmlformats.org/markup-compatibility/2006">
-    <mc:Choice xmlns:p14="http://schemas.microsoft.com/office/powerpoint/2010/main" Requires="p14">
+  <mc:AlternateContent xmlns:mc="http://schemas.openxmlformats.org/markup-compatibility/2006" xmlns:p14="http://schemas.microsoft.com/office/powerpoint/2010/main">
+    <mc:Choice Requires="p14">
       <p:transition spd="med" p14:dur="700">
         <p:fade/>
       </p:transition>
     </mc:Choice>
-    <mc:Fallback>
+    <mc:Fallback xmlns="">
       <p:transition spd="med">
         <p:fade/>
       </p:transition>

</xml_diff>